<commit_message>
Update the organization chart on the presentation
</commit_message>
<xml_diff>
--- a/Presentation.pptx
+++ b/Presentation.pptx
@@ -70,7 +70,7 @@
       </p:grpSpPr>
       <p:sp>
         <p:nvSpPr>
-          <p:cNvPr id="24" name="PlaceHolder 1"/>
+          <p:cNvPr id="23" name="PlaceHolder 1"/>
           <p:cNvSpPr>
             <a:spLocks noGrp="1"/>
           </p:cNvSpPr>
@@ -97,7 +97,7 @@
       </p:sp>
       <p:sp>
         <p:nvSpPr>
-          <p:cNvPr id="25" name="PlaceHolder 2"/>
+          <p:cNvPr id="24" name="PlaceHolder 2"/>
           <p:cNvSpPr>
             <a:spLocks noGrp="1"/>
           </p:cNvSpPr>
@@ -123,7 +123,7 @@
       </p:sp>
       <p:sp>
         <p:nvSpPr>
-          <p:cNvPr id="26" name="PlaceHolder 3"/>
+          <p:cNvPr id="25" name="PlaceHolder 3"/>
           <p:cNvSpPr>
             <a:spLocks noGrp="1"/>
           </p:cNvSpPr>
@@ -171,7 +171,7 @@
       </p:grpSpPr>
       <p:sp>
         <p:nvSpPr>
-          <p:cNvPr id="27" name="PlaceHolder 1"/>
+          <p:cNvPr id="26" name="PlaceHolder 1"/>
           <p:cNvSpPr>
             <a:spLocks noGrp="1"/>
           </p:cNvSpPr>
@@ -198,7 +198,7 @@
       </p:sp>
       <p:sp>
         <p:nvSpPr>
-          <p:cNvPr id="28" name="PlaceHolder 2"/>
+          <p:cNvPr id="27" name="PlaceHolder 2"/>
           <p:cNvSpPr>
             <a:spLocks noGrp="1"/>
           </p:cNvSpPr>
@@ -224,7 +224,7 @@
       </p:sp>
       <p:sp>
         <p:nvSpPr>
-          <p:cNvPr id="29" name="PlaceHolder 3"/>
+          <p:cNvPr id="28" name="PlaceHolder 3"/>
           <p:cNvSpPr>
             <a:spLocks noGrp="1"/>
           </p:cNvSpPr>
@@ -250,7 +250,7 @@
       </p:sp>
       <p:sp>
         <p:nvSpPr>
-          <p:cNvPr id="30" name="PlaceHolder 4"/>
+          <p:cNvPr id="29" name="PlaceHolder 4"/>
           <p:cNvSpPr>
             <a:spLocks noGrp="1"/>
           </p:cNvSpPr>
@@ -276,7 +276,7 @@
       </p:sp>
       <p:sp>
         <p:nvSpPr>
-          <p:cNvPr id="31" name="PlaceHolder 5"/>
+          <p:cNvPr id="30" name="PlaceHolder 5"/>
           <p:cNvSpPr>
             <a:spLocks noGrp="1"/>
           </p:cNvSpPr>
@@ -324,7 +324,7 @@
       </p:grpSpPr>
       <p:sp>
         <p:nvSpPr>
-          <p:cNvPr id="32" name="PlaceHolder 1"/>
+          <p:cNvPr id="31" name="PlaceHolder 1"/>
           <p:cNvSpPr>
             <a:spLocks noGrp="1"/>
           </p:cNvSpPr>
@@ -351,7 +351,7 @@
       </p:sp>
       <p:sp>
         <p:nvSpPr>
-          <p:cNvPr id="33" name="PlaceHolder 2"/>
+          <p:cNvPr id="32" name="PlaceHolder 2"/>
           <p:cNvSpPr>
             <a:spLocks noGrp="1"/>
           </p:cNvSpPr>
@@ -377,7 +377,7 @@
       </p:sp>
       <p:sp>
         <p:nvSpPr>
-          <p:cNvPr id="34" name="PlaceHolder 3"/>
+          <p:cNvPr id="33" name="PlaceHolder 3"/>
           <p:cNvSpPr>
             <a:spLocks noGrp="1"/>
           </p:cNvSpPr>
@@ -403,7 +403,7 @@
       </p:sp>
       <p:pic>
         <p:nvPicPr>
-          <p:cNvPr id="35" name="" descr=""/>
+          <p:cNvPr id="34" name="" descr=""/>
           <p:cNvPicPr/>
           <p:nvPr/>
         </p:nvPicPr>
@@ -426,7 +426,7 @@
       </p:pic>
       <p:pic>
         <p:nvPicPr>
-          <p:cNvPr id="36" name="" descr=""/>
+          <p:cNvPr id="35" name="" descr=""/>
           <p:cNvPicPr/>
           <p:nvPr/>
         </p:nvPicPr>
@@ -493,7 +493,7 @@
       </p:grpSpPr>
       <p:sp>
         <p:nvSpPr>
-          <p:cNvPr id="39" name="PlaceHolder 1"/>
+          <p:cNvPr id="38" name="PlaceHolder 1"/>
           <p:cNvSpPr>
             <a:spLocks noGrp="1"/>
           </p:cNvSpPr>
@@ -520,7 +520,7 @@
       </p:sp>
       <p:sp>
         <p:nvSpPr>
-          <p:cNvPr id="40" name="PlaceHolder 2"/>
+          <p:cNvPr id="39" name="PlaceHolder 2"/>
           <p:cNvSpPr>
             <a:spLocks noGrp="1"/>
           </p:cNvSpPr>
@@ -569,7 +569,7 @@
       </p:grpSpPr>
       <p:sp>
         <p:nvSpPr>
-          <p:cNvPr id="41" name="PlaceHolder 1"/>
+          <p:cNvPr id="40" name="PlaceHolder 1"/>
           <p:cNvSpPr>
             <a:spLocks noGrp="1"/>
           </p:cNvSpPr>
@@ -596,7 +596,7 @@
       </p:sp>
       <p:sp>
         <p:nvSpPr>
-          <p:cNvPr id="42" name="PlaceHolder 2"/>
+          <p:cNvPr id="41" name="PlaceHolder 2"/>
           <p:cNvSpPr>
             <a:spLocks noGrp="1"/>
           </p:cNvSpPr>
@@ -644,7 +644,7 @@
       </p:grpSpPr>
       <p:sp>
         <p:nvSpPr>
-          <p:cNvPr id="43" name="PlaceHolder 1"/>
+          <p:cNvPr id="42" name="PlaceHolder 1"/>
           <p:cNvSpPr>
             <a:spLocks noGrp="1"/>
           </p:cNvSpPr>
@@ -671,7 +671,7 @@
       </p:sp>
       <p:sp>
         <p:nvSpPr>
-          <p:cNvPr id="44" name="PlaceHolder 2"/>
+          <p:cNvPr id="43" name="PlaceHolder 2"/>
           <p:cNvSpPr>
             <a:spLocks noGrp="1"/>
           </p:cNvSpPr>
@@ -697,7 +697,7 @@
       </p:sp>
       <p:sp>
         <p:nvSpPr>
-          <p:cNvPr id="45" name="PlaceHolder 3"/>
+          <p:cNvPr id="44" name="PlaceHolder 3"/>
           <p:cNvSpPr>
             <a:spLocks noGrp="1"/>
           </p:cNvSpPr>
@@ -745,7 +745,7 @@
       </p:grpSpPr>
       <p:sp>
         <p:nvSpPr>
-          <p:cNvPr id="46" name="PlaceHolder 1"/>
+          <p:cNvPr id="45" name="PlaceHolder 1"/>
           <p:cNvSpPr>
             <a:spLocks noGrp="1"/>
           </p:cNvSpPr>
@@ -794,7 +794,7 @@
       </p:grpSpPr>
       <p:sp>
         <p:nvSpPr>
-          <p:cNvPr id="47" name="PlaceHolder 1"/>
+          <p:cNvPr id="46" name="PlaceHolder 1"/>
           <p:cNvSpPr>
             <a:spLocks noGrp="1"/>
           </p:cNvSpPr>
@@ -843,7 +843,7 @@
       </p:grpSpPr>
       <p:sp>
         <p:nvSpPr>
-          <p:cNvPr id="48" name="PlaceHolder 1"/>
+          <p:cNvPr id="47" name="PlaceHolder 1"/>
           <p:cNvSpPr>
             <a:spLocks noGrp="1"/>
           </p:cNvSpPr>
@@ -870,7 +870,7 @@
       </p:sp>
       <p:sp>
         <p:nvSpPr>
-          <p:cNvPr id="49" name="PlaceHolder 2"/>
+          <p:cNvPr id="48" name="PlaceHolder 2"/>
           <p:cNvSpPr>
             <a:spLocks noGrp="1"/>
           </p:cNvSpPr>
@@ -896,7 +896,7 @@
       </p:sp>
       <p:sp>
         <p:nvSpPr>
-          <p:cNvPr id="50" name="PlaceHolder 3"/>
+          <p:cNvPr id="49" name="PlaceHolder 3"/>
           <p:cNvSpPr>
             <a:spLocks noGrp="1"/>
           </p:cNvSpPr>
@@ -922,7 +922,7 @@
       </p:sp>
       <p:sp>
         <p:nvSpPr>
-          <p:cNvPr id="51" name="PlaceHolder 4"/>
+          <p:cNvPr id="50" name="PlaceHolder 4"/>
           <p:cNvSpPr>
             <a:spLocks noGrp="1"/>
           </p:cNvSpPr>
@@ -970,7 +970,7 @@
       </p:grpSpPr>
       <p:sp>
         <p:nvSpPr>
-          <p:cNvPr id="3" name="PlaceHolder 1"/>
+          <p:cNvPr id="2" name="PlaceHolder 1"/>
           <p:cNvSpPr>
             <a:spLocks noGrp="1"/>
           </p:cNvSpPr>
@@ -997,7 +997,7 @@
       </p:sp>
       <p:sp>
         <p:nvSpPr>
-          <p:cNvPr id="4" name="PlaceHolder 2"/>
+          <p:cNvPr id="3" name="PlaceHolder 2"/>
           <p:cNvSpPr>
             <a:spLocks noGrp="1"/>
           </p:cNvSpPr>
@@ -1046,7 +1046,7 @@
       </p:grpSpPr>
       <p:sp>
         <p:nvSpPr>
-          <p:cNvPr id="52" name="PlaceHolder 1"/>
+          <p:cNvPr id="51" name="PlaceHolder 1"/>
           <p:cNvSpPr>
             <a:spLocks noGrp="1"/>
           </p:cNvSpPr>
@@ -1073,7 +1073,7 @@
       </p:sp>
       <p:sp>
         <p:nvSpPr>
-          <p:cNvPr id="53" name="PlaceHolder 2"/>
+          <p:cNvPr id="52" name="PlaceHolder 2"/>
           <p:cNvSpPr>
             <a:spLocks noGrp="1"/>
           </p:cNvSpPr>
@@ -1099,7 +1099,7 @@
       </p:sp>
       <p:sp>
         <p:nvSpPr>
-          <p:cNvPr id="54" name="PlaceHolder 3"/>
+          <p:cNvPr id="53" name="PlaceHolder 3"/>
           <p:cNvSpPr>
             <a:spLocks noGrp="1"/>
           </p:cNvSpPr>
@@ -1125,7 +1125,7 @@
       </p:sp>
       <p:sp>
         <p:nvSpPr>
-          <p:cNvPr id="55" name="PlaceHolder 4"/>
+          <p:cNvPr id="54" name="PlaceHolder 4"/>
           <p:cNvSpPr>
             <a:spLocks noGrp="1"/>
           </p:cNvSpPr>
@@ -1173,7 +1173,7 @@
       </p:grpSpPr>
       <p:sp>
         <p:nvSpPr>
-          <p:cNvPr id="56" name="PlaceHolder 1"/>
+          <p:cNvPr id="55" name="PlaceHolder 1"/>
           <p:cNvSpPr>
             <a:spLocks noGrp="1"/>
           </p:cNvSpPr>
@@ -1200,7 +1200,7 @@
       </p:sp>
       <p:sp>
         <p:nvSpPr>
-          <p:cNvPr id="57" name="PlaceHolder 2"/>
+          <p:cNvPr id="56" name="PlaceHolder 2"/>
           <p:cNvSpPr>
             <a:spLocks noGrp="1"/>
           </p:cNvSpPr>
@@ -1226,7 +1226,7 @@
       </p:sp>
       <p:sp>
         <p:nvSpPr>
-          <p:cNvPr id="58" name="PlaceHolder 3"/>
+          <p:cNvPr id="57" name="PlaceHolder 3"/>
           <p:cNvSpPr>
             <a:spLocks noGrp="1"/>
           </p:cNvSpPr>
@@ -1252,7 +1252,7 @@
       </p:sp>
       <p:sp>
         <p:nvSpPr>
-          <p:cNvPr id="59" name="PlaceHolder 4"/>
+          <p:cNvPr id="58" name="PlaceHolder 4"/>
           <p:cNvSpPr>
             <a:spLocks noGrp="1"/>
           </p:cNvSpPr>
@@ -1300,7 +1300,7 @@
       </p:grpSpPr>
       <p:sp>
         <p:nvSpPr>
-          <p:cNvPr id="60" name="PlaceHolder 1"/>
+          <p:cNvPr id="59" name="PlaceHolder 1"/>
           <p:cNvSpPr>
             <a:spLocks noGrp="1"/>
           </p:cNvSpPr>
@@ -1327,7 +1327,7 @@
       </p:sp>
       <p:sp>
         <p:nvSpPr>
-          <p:cNvPr id="61" name="PlaceHolder 2"/>
+          <p:cNvPr id="60" name="PlaceHolder 2"/>
           <p:cNvSpPr>
             <a:spLocks noGrp="1"/>
           </p:cNvSpPr>
@@ -1353,7 +1353,7 @@
       </p:sp>
       <p:sp>
         <p:nvSpPr>
-          <p:cNvPr id="62" name="PlaceHolder 3"/>
+          <p:cNvPr id="61" name="PlaceHolder 3"/>
           <p:cNvSpPr>
             <a:spLocks noGrp="1"/>
           </p:cNvSpPr>
@@ -1401,7 +1401,7 @@
       </p:grpSpPr>
       <p:sp>
         <p:nvSpPr>
-          <p:cNvPr id="63" name="PlaceHolder 1"/>
+          <p:cNvPr id="62" name="PlaceHolder 1"/>
           <p:cNvSpPr>
             <a:spLocks noGrp="1"/>
           </p:cNvSpPr>
@@ -1428,7 +1428,7 @@
       </p:sp>
       <p:sp>
         <p:nvSpPr>
-          <p:cNvPr id="64" name="PlaceHolder 2"/>
+          <p:cNvPr id="63" name="PlaceHolder 2"/>
           <p:cNvSpPr>
             <a:spLocks noGrp="1"/>
           </p:cNvSpPr>
@@ -1454,7 +1454,7 @@
       </p:sp>
       <p:sp>
         <p:nvSpPr>
-          <p:cNvPr id="65" name="PlaceHolder 3"/>
+          <p:cNvPr id="64" name="PlaceHolder 3"/>
           <p:cNvSpPr>
             <a:spLocks noGrp="1"/>
           </p:cNvSpPr>
@@ -1480,7 +1480,7 @@
       </p:sp>
       <p:sp>
         <p:nvSpPr>
-          <p:cNvPr id="66" name="PlaceHolder 4"/>
+          <p:cNvPr id="65" name="PlaceHolder 4"/>
           <p:cNvSpPr>
             <a:spLocks noGrp="1"/>
           </p:cNvSpPr>
@@ -1506,7 +1506,7 @@
       </p:sp>
       <p:sp>
         <p:nvSpPr>
-          <p:cNvPr id="67" name="PlaceHolder 5"/>
+          <p:cNvPr id="66" name="PlaceHolder 5"/>
           <p:cNvSpPr>
             <a:spLocks noGrp="1"/>
           </p:cNvSpPr>
@@ -1554,7 +1554,7 @@
       </p:grpSpPr>
       <p:sp>
         <p:nvSpPr>
-          <p:cNvPr id="68" name="PlaceHolder 1"/>
+          <p:cNvPr id="67" name="PlaceHolder 1"/>
           <p:cNvSpPr>
             <a:spLocks noGrp="1"/>
           </p:cNvSpPr>
@@ -1581,7 +1581,7 @@
       </p:sp>
       <p:sp>
         <p:nvSpPr>
-          <p:cNvPr id="69" name="PlaceHolder 2"/>
+          <p:cNvPr id="68" name="PlaceHolder 2"/>
           <p:cNvSpPr>
             <a:spLocks noGrp="1"/>
           </p:cNvSpPr>
@@ -1607,7 +1607,7 @@
       </p:sp>
       <p:sp>
         <p:nvSpPr>
-          <p:cNvPr id="70" name="PlaceHolder 3"/>
+          <p:cNvPr id="69" name="PlaceHolder 3"/>
           <p:cNvSpPr>
             <a:spLocks noGrp="1"/>
           </p:cNvSpPr>
@@ -1633,7 +1633,7 @@
       </p:sp>
       <p:pic>
         <p:nvPicPr>
-          <p:cNvPr id="71" name="" descr=""/>
+          <p:cNvPr id="70" name="" descr=""/>
           <p:cNvPicPr/>
           <p:nvPr/>
         </p:nvPicPr>
@@ -1656,7 +1656,7 @@
       </p:pic>
       <p:pic>
         <p:nvPicPr>
-          <p:cNvPr id="72" name="" descr=""/>
+          <p:cNvPr id="71" name="" descr=""/>
           <p:cNvPicPr/>
           <p:nvPr/>
         </p:nvPicPr>
@@ -1701,7 +1701,7 @@
       </p:grpSpPr>
       <p:sp>
         <p:nvSpPr>
-          <p:cNvPr id="5" name="PlaceHolder 1"/>
+          <p:cNvPr id="4" name="PlaceHolder 1"/>
           <p:cNvSpPr>
             <a:spLocks noGrp="1"/>
           </p:cNvSpPr>
@@ -1728,7 +1728,7 @@
       </p:sp>
       <p:sp>
         <p:nvSpPr>
-          <p:cNvPr id="6" name="PlaceHolder 2"/>
+          <p:cNvPr id="5" name="PlaceHolder 2"/>
           <p:cNvSpPr>
             <a:spLocks noGrp="1"/>
           </p:cNvSpPr>
@@ -1776,7 +1776,7 @@
       </p:grpSpPr>
       <p:sp>
         <p:nvSpPr>
-          <p:cNvPr id="7" name="PlaceHolder 1"/>
+          <p:cNvPr id="6" name="PlaceHolder 1"/>
           <p:cNvSpPr>
             <a:spLocks noGrp="1"/>
           </p:cNvSpPr>
@@ -1803,7 +1803,7 @@
       </p:sp>
       <p:sp>
         <p:nvSpPr>
-          <p:cNvPr id="8" name="PlaceHolder 2"/>
+          <p:cNvPr id="7" name="PlaceHolder 2"/>
           <p:cNvSpPr>
             <a:spLocks noGrp="1"/>
           </p:cNvSpPr>
@@ -1829,7 +1829,7 @@
       </p:sp>
       <p:sp>
         <p:nvSpPr>
-          <p:cNvPr id="9" name="PlaceHolder 3"/>
+          <p:cNvPr id="8" name="PlaceHolder 3"/>
           <p:cNvSpPr>
             <a:spLocks noGrp="1"/>
           </p:cNvSpPr>
@@ -1877,7 +1877,7 @@
       </p:grpSpPr>
       <p:sp>
         <p:nvSpPr>
-          <p:cNvPr id="10" name="PlaceHolder 1"/>
+          <p:cNvPr id="9" name="PlaceHolder 1"/>
           <p:cNvSpPr>
             <a:spLocks noGrp="1"/>
           </p:cNvSpPr>
@@ -1926,7 +1926,7 @@
       </p:grpSpPr>
       <p:sp>
         <p:nvSpPr>
-          <p:cNvPr id="11" name="PlaceHolder 1"/>
+          <p:cNvPr id="10" name="PlaceHolder 1"/>
           <p:cNvSpPr>
             <a:spLocks noGrp="1"/>
           </p:cNvSpPr>
@@ -1975,7 +1975,7 @@
       </p:grpSpPr>
       <p:sp>
         <p:nvSpPr>
-          <p:cNvPr id="12" name="PlaceHolder 1"/>
+          <p:cNvPr id="11" name="PlaceHolder 1"/>
           <p:cNvSpPr>
             <a:spLocks noGrp="1"/>
           </p:cNvSpPr>
@@ -2002,7 +2002,7 @@
       </p:sp>
       <p:sp>
         <p:nvSpPr>
-          <p:cNvPr id="13" name="PlaceHolder 2"/>
+          <p:cNvPr id="12" name="PlaceHolder 2"/>
           <p:cNvSpPr>
             <a:spLocks noGrp="1"/>
           </p:cNvSpPr>
@@ -2028,7 +2028,7 @@
       </p:sp>
       <p:sp>
         <p:nvSpPr>
-          <p:cNvPr id="14" name="PlaceHolder 3"/>
+          <p:cNvPr id="13" name="PlaceHolder 3"/>
           <p:cNvSpPr>
             <a:spLocks noGrp="1"/>
           </p:cNvSpPr>
@@ -2054,7 +2054,7 @@
       </p:sp>
       <p:sp>
         <p:nvSpPr>
-          <p:cNvPr id="15" name="PlaceHolder 4"/>
+          <p:cNvPr id="14" name="PlaceHolder 4"/>
           <p:cNvSpPr>
             <a:spLocks noGrp="1"/>
           </p:cNvSpPr>
@@ -2102,7 +2102,7 @@
       </p:grpSpPr>
       <p:sp>
         <p:nvSpPr>
-          <p:cNvPr id="16" name="PlaceHolder 1"/>
+          <p:cNvPr id="15" name="PlaceHolder 1"/>
           <p:cNvSpPr>
             <a:spLocks noGrp="1"/>
           </p:cNvSpPr>
@@ -2129,7 +2129,7 @@
       </p:sp>
       <p:sp>
         <p:nvSpPr>
-          <p:cNvPr id="17" name="PlaceHolder 2"/>
+          <p:cNvPr id="16" name="PlaceHolder 2"/>
           <p:cNvSpPr>
             <a:spLocks noGrp="1"/>
           </p:cNvSpPr>
@@ -2155,7 +2155,7 @@
       </p:sp>
       <p:sp>
         <p:nvSpPr>
-          <p:cNvPr id="18" name="PlaceHolder 3"/>
+          <p:cNvPr id="17" name="PlaceHolder 3"/>
           <p:cNvSpPr>
             <a:spLocks noGrp="1"/>
           </p:cNvSpPr>
@@ -2181,7 +2181,7 @@
       </p:sp>
       <p:sp>
         <p:nvSpPr>
-          <p:cNvPr id="19" name="PlaceHolder 4"/>
+          <p:cNvPr id="18" name="PlaceHolder 4"/>
           <p:cNvSpPr>
             <a:spLocks noGrp="1"/>
           </p:cNvSpPr>
@@ -2229,7 +2229,7 @@
       </p:grpSpPr>
       <p:sp>
         <p:nvSpPr>
-          <p:cNvPr id="20" name="PlaceHolder 1"/>
+          <p:cNvPr id="19" name="PlaceHolder 1"/>
           <p:cNvSpPr>
             <a:spLocks noGrp="1"/>
           </p:cNvSpPr>
@@ -2256,7 +2256,7 @@
       </p:sp>
       <p:sp>
         <p:nvSpPr>
-          <p:cNvPr id="21" name="PlaceHolder 2"/>
+          <p:cNvPr id="20" name="PlaceHolder 2"/>
           <p:cNvSpPr>
             <a:spLocks noGrp="1"/>
           </p:cNvSpPr>
@@ -2282,7 +2282,7 @@
       </p:sp>
       <p:sp>
         <p:nvSpPr>
-          <p:cNvPr id="22" name="PlaceHolder 3"/>
+          <p:cNvPr id="21" name="PlaceHolder 3"/>
           <p:cNvSpPr>
             <a:spLocks noGrp="1"/>
           </p:cNvSpPr>
@@ -2308,7 +2308,7 @@
       </p:sp>
       <p:sp>
         <p:nvSpPr>
-          <p:cNvPr id="23" name="PlaceHolder 4"/>
+          <p:cNvPr id="22" name="PlaceHolder 4"/>
           <p:cNvSpPr>
             <a:spLocks noGrp="1"/>
           </p:cNvSpPr>
@@ -2376,8 +2376,8 @@
         </p:nvSpPr>
         <p:spPr>
           <a:xfrm>
-            <a:off x="457200" y="274680"/>
-            <a:ext cx="8228880" cy="1142280"/>
+            <a:off x="457200" y="273600"/>
+            <a:ext cx="8228880" cy="1144440"/>
           </a:xfrm>
           <a:prstGeom prst="rect">
             <a:avLst/>
@@ -2394,33 +2394,6 @@
       <p:sp>
         <p:nvSpPr>
           <p:cNvPr id="1" name="PlaceHolder 2"/>
-          <p:cNvSpPr>
-            <a:spLocks noGrp="1"/>
-          </p:cNvSpPr>
-          <p:nvPr>
-            <p:ph type="subTitle"/>
-          </p:nvPr>
-        </p:nvSpPr>
-        <p:spPr>
-          <a:xfrm>
-            <a:off x="457200" y="1600200"/>
-            <a:ext cx="8228880" cy="4525200"/>
-          </a:xfrm>
-          <a:prstGeom prst="rect">
-            <a:avLst/>
-          </a:prstGeom>
-        </p:spPr>
-        <p:txBody>
-          <a:bodyPr lIns="0" rIns="0" tIns="0" bIns="0" anchor="ctr"/>
-          <a:p>
-            <a:pPr algn="ctr"/>
-            <a:endParaRPr/>
-          </a:p>
-        </p:txBody>
-      </p:sp>
-      <p:sp>
-        <p:nvSpPr>
-          <p:cNvPr id="2" name="PlaceHolder 3"/>
           <p:cNvSpPr>
             <a:spLocks noGrp="1"/>
           </p:cNvSpPr>
@@ -2431,7 +2404,7 @@
         <p:spPr>
           <a:xfrm>
             <a:off x="457200" y="1604520"/>
-            <a:ext cx="8229240" cy="3976920"/>
+            <a:ext cx="8228880" cy="3976560"/>
           </a:xfrm>
           <a:prstGeom prst="rect">
             <a:avLst/>
@@ -2449,7 +2422,7 @@
               <a:buChar char=""/>
             </a:pPr>
             <a:r>
-              <a:rPr lang="en-US" sz="3200" spc="-1">
+              <a:rPr lang="en-US" sz="1800" spc="-1">
                 <a:latin typeface="Arial"/>
               </a:rPr>
               <a:t>Click to edit the outline text format</a:t>
@@ -2466,7 +2439,7 @@
               <a:buChar char=""/>
             </a:pPr>
             <a:r>
-              <a:rPr lang="en-US" sz="2800" spc="-1">
+              <a:rPr lang="en-US" sz="1800" spc="-1">
                 <a:latin typeface="Arial"/>
               </a:rPr>
               <a:t>Second Outline Level</a:t>
@@ -2483,7 +2456,7 @@
               <a:buChar char=""/>
             </a:pPr>
             <a:r>
-              <a:rPr lang="en-US" sz="2400" spc="-1">
+              <a:rPr lang="en-US" sz="1800" spc="-1">
                 <a:latin typeface="Arial"/>
               </a:rPr>
               <a:t>Third Outline Level</a:t>
@@ -2500,7 +2473,7 @@
               <a:buChar char=""/>
             </a:pPr>
             <a:r>
-              <a:rPr lang="en-US" sz="2000" spc="-1">
+              <a:rPr lang="en-US" sz="1800" spc="-1">
                 <a:latin typeface="Arial"/>
               </a:rPr>
               <a:t>Fourth Outline Level</a:t>
@@ -2517,7 +2490,7 @@
               <a:buChar char=""/>
             </a:pPr>
             <a:r>
-              <a:rPr lang="en-US" sz="2000" spc="-1">
+              <a:rPr lang="en-US" sz="1800" spc="-1">
                 <a:latin typeface="Arial"/>
               </a:rPr>
               <a:t>Fifth Outline Level</a:t>
@@ -2534,7 +2507,7 @@
               <a:buChar char=""/>
             </a:pPr>
             <a:r>
-              <a:rPr lang="en-US" sz="2000" spc="-1">
+              <a:rPr lang="en-US" sz="1800" spc="-1">
                 <a:latin typeface="Arial"/>
               </a:rPr>
               <a:t>Sixth Outline Level</a:t>
@@ -2551,7 +2524,7 @@
               <a:buChar char=""/>
             </a:pPr>
             <a:r>
-              <a:rPr lang="en-US" sz="2000" spc="-1">
+              <a:rPr lang="en-US" sz="1800" spc="-1">
                 <a:latin typeface="Arial"/>
               </a:rPr>
               <a:t>Seventh Outline Level</a:t>
@@ -2609,7 +2582,7 @@
       </p:grpSpPr>
       <p:sp>
         <p:nvSpPr>
-          <p:cNvPr id="37" name="PlaceHolder 1"/>
+          <p:cNvPr id="36" name="PlaceHolder 1"/>
           <p:cNvSpPr>
             <a:spLocks noGrp="1"/>
           </p:cNvSpPr>
@@ -2642,7 +2615,7 @@
       </p:sp>
       <p:sp>
         <p:nvSpPr>
-          <p:cNvPr id="38" name="PlaceHolder 2"/>
+          <p:cNvPr id="37" name="PlaceHolder 2"/>
           <p:cNvSpPr>
             <a:spLocks noGrp="1"/>
           </p:cNvSpPr>
@@ -2831,14 +2804,14 @@
       </p:grpSpPr>
       <p:sp>
         <p:nvSpPr>
-          <p:cNvPr id="73" name="CustomShape 1"/>
+          <p:cNvPr id="72" name="CustomShape 1"/>
           <p:cNvSpPr/>
           <p:nvPr/>
         </p:nvSpPr>
         <p:spPr>
           <a:xfrm>
             <a:off x="0" y="6572160"/>
-            <a:ext cx="785160" cy="285120"/>
+            <a:ext cx="784800" cy="284760"/>
           </a:xfrm>
           <a:prstGeom prst="rect">
             <a:avLst/>
@@ -2870,14 +2843,14 @@
       </p:sp>
       <p:sp>
         <p:nvSpPr>
-          <p:cNvPr id="74" name="CustomShape 2"/>
+          <p:cNvPr id="73" name="CustomShape 2"/>
           <p:cNvSpPr/>
           <p:nvPr/>
         </p:nvSpPr>
         <p:spPr>
           <a:xfrm>
             <a:off x="285840" y="5857920"/>
-            <a:ext cx="5319000" cy="646920"/>
+            <a:ext cx="5318640" cy="646560"/>
           </a:xfrm>
           <a:prstGeom prst="rect">
             <a:avLst/>
@@ -2912,6 +2885,7 @@
                   </a:solidFill>
                 </a:uFill>
                 <a:latin typeface="Aharoni"/>
+                <a:ea typeface="DejaVu Sans"/>
               </a:rPr>
               <a:t>Fps “Flight Planning System”</a:t>
             </a:r>
@@ -2921,14 +2895,14 @@
       </p:sp>
       <p:sp>
         <p:nvSpPr>
-          <p:cNvPr id="75" name="CustomShape 3"/>
+          <p:cNvPr id="74" name="CustomShape 3"/>
           <p:cNvSpPr/>
           <p:nvPr/>
         </p:nvSpPr>
         <p:spPr>
           <a:xfrm>
             <a:off x="5364000" y="5000760"/>
-            <a:ext cx="3456720" cy="1642320"/>
+            <a:ext cx="3456360" cy="1641960"/>
           </a:xfrm>
           <a:prstGeom prst="rect">
             <a:avLst/>
@@ -3066,14 +3040,14 @@
       </p:sp>
       <p:sp>
         <p:nvSpPr>
-          <p:cNvPr id="76" name="CustomShape 4"/>
+          <p:cNvPr id="75" name="CustomShape 4"/>
           <p:cNvSpPr/>
           <p:nvPr/>
         </p:nvSpPr>
         <p:spPr>
           <a:xfrm>
             <a:off x="1643040" y="357120"/>
-            <a:ext cx="5319000" cy="575640"/>
+            <a:ext cx="5318640" cy="575280"/>
           </a:xfrm>
           <a:prstGeom prst="rect">
             <a:avLst/>
@@ -3167,14 +3141,14 @@
       </p:grpSpPr>
       <p:sp>
         <p:nvSpPr>
-          <p:cNvPr id="105" name="CustomShape 1"/>
+          <p:cNvPr id="104" name="CustomShape 1"/>
           <p:cNvSpPr/>
           <p:nvPr/>
         </p:nvSpPr>
         <p:spPr>
           <a:xfrm>
             <a:off x="457200" y="1714320"/>
-            <a:ext cx="8228880" cy="4411080"/>
+            <a:ext cx="8228520" cy="4410720"/>
           </a:xfrm>
           <a:prstGeom prst="rect">
             <a:avLst/>
@@ -3193,7 +3167,7 @@
         <p:txBody>
           <a:bodyPr lIns="90000" rIns="90000" tIns="45000" bIns="45000"/>
           <a:p>
-            <a:pPr marL="343080" indent="-342360">
+            <a:pPr marL="343080" indent="-342000">
               <a:lnSpc>
                 <a:spcPct val="100000"/>
               </a:lnSpc>
@@ -3209,13 +3183,14 @@
                   </a:solidFill>
                 </a:uFill>
                 <a:latin typeface="Calibri"/>
+                <a:ea typeface="DejaVu Sans"/>
               </a:rPr>
               <a:t>The navigation scheme :</a:t>
             </a:r>
             <a:endParaRPr/>
           </a:p>
           <a:p>
-            <a:pPr marL="343080" indent="-342360">
+            <a:pPr marL="343080" indent="-342000">
               <a:lnSpc>
                 <a:spcPct val="100000"/>
               </a:lnSpc>
@@ -3231,13 +3206,14 @@
                   </a:solidFill>
                 </a:uFill>
                 <a:latin typeface="Calibri"/>
+                <a:ea typeface="DejaVu Sans"/>
               </a:rPr>
               <a:t>We have decided to use two navigation scheme as requested.</a:t>
             </a:r>
             <a:endParaRPr/>
           </a:p>
           <a:p>
-            <a:pPr marL="343080" indent="-342360">
+            <a:pPr marL="343080" indent="-342000">
               <a:lnSpc>
                 <a:spcPct val="100000"/>
               </a:lnSpc>
@@ -3253,6 +3229,7 @@
                   </a:solidFill>
                 </a:uFill>
                 <a:latin typeface="Calibri"/>
+                <a:ea typeface="DejaVu Sans"/>
               </a:rPr>
               <a:t>for OCC:</a:t>
             </a:r>
@@ -3262,14 +3239,14 @@
       </p:sp>
       <p:sp>
         <p:nvSpPr>
-          <p:cNvPr id="106" name="CustomShape 2"/>
+          <p:cNvPr id="105" name="CustomShape 2"/>
           <p:cNvSpPr/>
           <p:nvPr/>
         </p:nvSpPr>
         <p:spPr>
           <a:xfrm>
             <a:off x="0" y="6572160"/>
-            <a:ext cx="785160" cy="285120"/>
+            <a:ext cx="784800" cy="284760"/>
           </a:xfrm>
           <a:prstGeom prst="rect">
             <a:avLst/>
@@ -3301,14 +3278,14 @@
       </p:sp>
       <p:sp>
         <p:nvSpPr>
-          <p:cNvPr id="107" name="CustomShape 3"/>
+          <p:cNvPr id="106" name="CustomShape 3"/>
           <p:cNvSpPr/>
           <p:nvPr/>
         </p:nvSpPr>
         <p:spPr>
           <a:xfrm>
             <a:off x="428760" y="642960"/>
-            <a:ext cx="8257320" cy="785160"/>
+            <a:ext cx="8256960" cy="784800"/>
           </a:xfrm>
           <a:prstGeom prst="rect">
             <a:avLst/>
@@ -3327,7 +3304,7 @@
         <p:txBody>
           <a:bodyPr lIns="90000" rIns="90000" tIns="45000" bIns="45000" anchor="ctr"/>
           <a:p>
-            <a:pPr marL="571680" indent="-570960">
+            <a:pPr marL="571680" indent="-570600">
               <a:lnSpc>
                 <a:spcPct val="100000"/>
               </a:lnSpc>
@@ -3343,6 +3320,7 @@
                   </a:solidFill>
                 </a:uFill>
                 <a:latin typeface="Calibri"/>
+                <a:ea typeface="DejaVu Sans"/>
               </a:rPr>
               <a:t>II.   Second lesson</a:t>
             </a:r>
@@ -3352,7 +3330,7 @@
       </p:sp>
       <p:pic>
         <p:nvPicPr>
-          <p:cNvPr id="108" name="Shape 90" descr=""/>
+          <p:cNvPr id="107" name="Shape 90" descr=""/>
           <p:cNvPicPr/>
           <p:nvPr/>
         </p:nvPicPr>
@@ -3363,7 +3341,7 @@
         <p:spPr>
           <a:xfrm>
             <a:off x="1223280" y="2520000"/>
-            <a:ext cx="6552360" cy="3415680"/>
+            <a:ext cx="6552000" cy="3415320"/>
           </a:xfrm>
           <a:prstGeom prst="rect">
             <a:avLst/>
@@ -3424,14 +3402,14 @@
       </p:grpSpPr>
       <p:sp>
         <p:nvSpPr>
-          <p:cNvPr id="109" name="CustomShape 1"/>
+          <p:cNvPr id="108" name="CustomShape 1"/>
           <p:cNvSpPr/>
           <p:nvPr/>
         </p:nvSpPr>
         <p:spPr>
           <a:xfrm>
             <a:off x="457200" y="1714320"/>
-            <a:ext cx="8228880" cy="4411080"/>
+            <a:ext cx="8228520" cy="4410720"/>
           </a:xfrm>
           <a:prstGeom prst="rect">
             <a:avLst/>
@@ -3450,7 +3428,7 @@
         <p:txBody>
           <a:bodyPr lIns="90000" rIns="90000" tIns="45000" bIns="45000"/>
           <a:p>
-            <a:pPr marL="343080" indent="-342360">
+            <a:pPr marL="343080" indent="-342000">
               <a:lnSpc>
                 <a:spcPct val="100000"/>
               </a:lnSpc>
@@ -3466,13 +3444,14 @@
                   </a:solidFill>
                 </a:uFill>
                 <a:latin typeface="Calibri"/>
+                <a:ea typeface="DejaVu Sans"/>
               </a:rPr>
               <a:t>The navigation scheme :</a:t>
             </a:r>
             <a:endParaRPr/>
           </a:p>
           <a:p>
-            <a:pPr marL="343080" indent="-342360">
+            <a:pPr marL="343080" indent="-342000">
               <a:lnSpc>
                 <a:spcPct val="100000"/>
               </a:lnSpc>
@@ -3488,6 +3467,7 @@
                   </a:solidFill>
                 </a:uFill>
                 <a:latin typeface="Calibri"/>
+                <a:ea typeface="DejaVu Sans"/>
               </a:rPr>
               <a:t>for the crew:</a:t>
             </a:r>
@@ -3497,14 +3477,14 @@
       </p:sp>
       <p:sp>
         <p:nvSpPr>
-          <p:cNvPr id="110" name="CustomShape 2"/>
+          <p:cNvPr id="109" name="CustomShape 2"/>
           <p:cNvSpPr/>
           <p:nvPr/>
         </p:nvSpPr>
         <p:spPr>
           <a:xfrm>
             <a:off x="0" y="6572160"/>
-            <a:ext cx="785160" cy="285120"/>
+            <a:ext cx="784800" cy="284760"/>
           </a:xfrm>
           <a:prstGeom prst="rect">
             <a:avLst/>
@@ -3536,14 +3516,14 @@
       </p:sp>
       <p:sp>
         <p:nvSpPr>
-          <p:cNvPr id="111" name="CustomShape 3"/>
+          <p:cNvPr id="110" name="CustomShape 3"/>
           <p:cNvSpPr/>
           <p:nvPr/>
         </p:nvSpPr>
         <p:spPr>
           <a:xfrm>
             <a:off x="428760" y="642960"/>
-            <a:ext cx="8257320" cy="785160"/>
+            <a:ext cx="8256960" cy="784800"/>
           </a:xfrm>
           <a:prstGeom prst="rect">
             <a:avLst/>
@@ -3562,7 +3542,7 @@
         <p:txBody>
           <a:bodyPr lIns="90000" rIns="90000" tIns="45000" bIns="45000" anchor="ctr"/>
           <a:p>
-            <a:pPr marL="571680" indent="-570960">
+            <a:pPr marL="571680" indent="-570600">
               <a:lnSpc>
                 <a:spcPct val="100000"/>
               </a:lnSpc>
@@ -3578,6 +3558,7 @@
                   </a:solidFill>
                 </a:uFill>
                 <a:latin typeface="Calibri"/>
+                <a:ea typeface="DejaVu Sans"/>
               </a:rPr>
               <a:t>II.   Second lesson</a:t>
             </a:r>
@@ -3587,7 +3568,7 @@
       </p:sp>
       <p:pic>
         <p:nvPicPr>
-          <p:cNvPr id="112" name="Shape 96" descr=""/>
+          <p:cNvPr id="111" name="Shape 96" descr=""/>
           <p:cNvPicPr/>
           <p:nvPr/>
         </p:nvPicPr>
@@ -3598,7 +3579,7 @@
         <p:spPr>
           <a:xfrm>
             <a:off x="1440000" y="2175840"/>
-            <a:ext cx="6552360" cy="3799800"/>
+            <a:ext cx="6552000" cy="3799440"/>
           </a:xfrm>
           <a:prstGeom prst="rect">
             <a:avLst/>
@@ -3659,14 +3640,14 @@
       </p:grpSpPr>
       <p:sp>
         <p:nvSpPr>
-          <p:cNvPr id="113" name="CustomShape 1"/>
+          <p:cNvPr id="112" name="CustomShape 1"/>
           <p:cNvSpPr/>
           <p:nvPr/>
         </p:nvSpPr>
         <p:spPr>
           <a:xfrm>
             <a:off x="457200" y="1714320"/>
-            <a:ext cx="8228880" cy="4411080"/>
+            <a:ext cx="8228520" cy="4410720"/>
           </a:xfrm>
           <a:prstGeom prst="rect">
             <a:avLst/>
@@ -3685,7 +3666,7 @@
         <p:txBody>
           <a:bodyPr lIns="90000" rIns="90000" tIns="45000" bIns="45000"/>
           <a:p>
-            <a:pPr marL="343080" indent="-342360">
+            <a:pPr marL="343080" indent="-342000">
               <a:lnSpc>
                 <a:spcPct val="100000"/>
               </a:lnSpc>
@@ -3701,21 +3682,22 @@
                   </a:solidFill>
                 </a:uFill>
                 <a:latin typeface="Calibri"/>
+                <a:ea typeface="DejaVu Sans"/>
               </a:rPr>
               <a:t>Our mock-ups:</a:t>
             </a:r>
             <a:endParaRPr/>
           </a:p>
           <a:p>
-            <a:pPr marL="343080" indent="-342360">
-              <a:lnSpc>
-                <a:spcPct val="100000"/>
-              </a:lnSpc>
-            </a:pPr>
-            <a:endParaRPr/>
-          </a:p>
-          <a:p>
-            <a:pPr marL="343080" indent="-342360">
+            <a:pPr marL="343080" indent="-342000">
+              <a:lnSpc>
+                <a:spcPct val="100000"/>
+              </a:lnSpc>
+            </a:pPr>
+            <a:endParaRPr/>
+          </a:p>
+          <a:p>
+            <a:pPr marL="343080" indent="-342000">
               <a:lnSpc>
                 <a:spcPct val="100000"/>
               </a:lnSpc>
@@ -3731,6 +3713,7 @@
                   </a:solidFill>
                 </a:uFill>
                 <a:latin typeface="Calibri"/>
+                <a:ea typeface="DejaVu Sans"/>
               </a:rPr>
               <a:t>For our mock-ups, we decided to do it with</a:t>
             </a:r>
@@ -3745,6 +3728,7 @@
                   </a:solidFill>
                 </a:uFill>
                 <a:latin typeface="Calibri"/>
+                <a:ea typeface="DejaVu Sans"/>
               </a:rPr>
               <a:t> Invasion </a:t>
             </a:r>
@@ -3759,13 +3743,14 @@
                   </a:solidFill>
                 </a:uFill>
                 <a:latin typeface="Calibri"/>
+                <a:ea typeface="DejaVu Sans"/>
               </a:rPr>
               <a:t>as Mr. Tekkal advices us.</a:t>
             </a:r>
             <a:endParaRPr/>
           </a:p>
           <a:p>
-            <a:pPr marL="343080" indent="-342360">
+            <a:pPr marL="343080" indent="-342000">
               <a:lnSpc>
                 <a:spcPct val="100000"/>
               </a:lnSpc>
@@ -3781,6 +3766,7 @@
                   </a:solidFill>
                 </a:uFill>
                 <a:latin typeface="Calibri"/>
+                <a:ea typeface="DejaVu Sans"/>
               </a:rPr>
               <a:t> </a:t>
             </a:r>
@@ -3795,21 +3781,22 @@
                   </a:solidFill>
                 </a:uFill>
                 <a:latin typeface="Calibri"/>
+                <a:ea typeface="DejaVu Sans"/>
               </a:rPr>
               <a:t>so here’s the link for it :</a:t>
             </a:r>
             <a:endParaRPr/>
           </a:p>
           <a:p>
-            <a:pPr marL="343080" indent="-342360">
-              <a:lnSpc>
-                <a:spcPct val="100000"/>
-              </a:lnSpc>
-            </a:pPr>
-            <a:endParaRPr/>
-          </a:p>
-          <a:p>
-            <a:pPr marL="343080" indent="-342360">
+            <a:pPr marL="343080" indent="-342000">
+              <a:lnSpc>
+                <a:spcPct val="100000"/>
+              </a:lnSpc>
+            </a:pPr>
+            <a:endParaRPr/>
+          </a:p>
+          <a:p>
+            <a:pPr marL="343080" indent="-342000">
               <a:lnSpc>
                 <a:spcPct val="100000"/>
               </a:lnSpc>
@@ -3825,45 +3812,46 @@
                   </a:solidFill>
                 </a:uFill>
                 <a:latin typeface="Arial"/>
+                <a:ea typeface="DejaVu Sans"/>
               </a:rPr>
               <a:t>https://invis.io/VW60KMLEY</a:t>
             </a:r>
             <a:endParaRPr/>
           </a:p>
           <a:p>
-            <a:pPr marL="343080" indent="-342360">
-              <a:lnSpc>
-                <a:spcPct val="100000"/>
-              </a:lnSpc>
-            </a:pPr>
-            <a:endParaRPr/>
-          </a:p>
-          <a:p>
-            <a:pPr marL="343080" indent="-342360">
-              <a:lnSpc>
-                <a:spcPct val="100000"/>
-              </a:lnSpc>
-            </a:pPr>
-            <a:endParaRPr/>
-          </a:p>
-          <a:p>
-            <a:pPr marL="343080" indent="-342360">
-              <a:lnSpc>
-                <a:spcPct val="100000"/>
-              </a:lnSpc>
-            </a:pPr>
-            <a:endParaRPr/>
-          </a:p>
-          <a:p>
-            <a:pPr marL="343080" indent="-342360">
-              <a:lnSpc>
-                <a:spcPct val="100000"/>
-              </a:lnSpc>
-            </a:pPr>
-            <a:endParaRPr/>
-          </a:p>
-          <a:p>
-            <a:pPr marL="343080" indent="-342360">
+            <a:pPr marL="343080" indent="-342000">
+              <a:lnSpc>
+                <a:spcPct val="100000"/>
+              </a:lnSpc>
+            </a:pPr>
+            <a:endParaRPr/>
+          </a:p>
+          <a:p>
+            <a:pPr marL="343080" indent="-342000">
+              <a:lnSpc>
+                <a:spcPct val="100000"/>
+              </a:lnSpc>
+            </a:pPr>
+            <a:endParaRPr/>
+          </a:p>
+          <a:p>
+            <a:pPr marL="343080" indent="-342000">
+              <a:lnSpc>
+                <a:spcPct val="100000"/>
+              </a:lnSpc>
+            </a:pPr>
+            <a:endParaRPr/>
+          </a:p>
+          <a:p>
+            <a:pPr marL="343080" indent="-342000">
+              <a:lnSpc>
+                <a:spcPct val="100000"/>
+              </a:lnSpc>
+            </a:pPr>
+            <a:endParaRPr/>
+          </a:p>
+          <a:p>
+            <a:pPr marL="343080" indent="-342000">
               <a:lnSpc>
                 <a:spcPct val="100000"/>
               </a:lnSpc>
@@ -3874,14 +3862,14 @@
       </p:sp>
       <p:sp>
         <p:nvSpPr>
-          <p:cNvPr id="114" name="CustomShape 2"/>
+          <p:cNvPr id="113" name="CustomShape 2"/>
           <p:cNvSpPr/>
           <p:nvPr/>
         </p:nvSpPr>
         <p:spPr>
           <a:xfrm>
             <a:off x="0" y="6572160"/>
-            <a:ext cx="785160" cy="285120"/>
+            <a:ext cx="784800" cy="284760"/>
           </a:xfrm>
           <a:prstGeom prst="rect">
             <a:avLst/>
@@ -3913,14 +3901,14 @@
       </p:sp>
       <p:sp>
         <p:nvSpPr>
-          <p:cNvPr id="115" name="CustomShape 3"/>
+          <p:cNvPr id="114" name="CustomShape 3"/>
           <p:cNvSpPr/>
           <p:nvPr/>
         </p:nvSpPr>
         <p:spPr>
           <a:xfrm>
             <a:off x="428760" y="642960"/>
-            <a:ext cx="8257320" cy="785160"/>
+            <a:ext cx="8256960" cy="784800"/>
           </a:xfrm>
           <a:prstGeom prst="rect">
             <a:avLst/>
@@ -3939,7 +3927,7 @@
         <p:txBody>
           <a:bodyPr lIns="90000" rIns="90000" tIns="45000" bIns="45000" anchor="ctr"/>
           <a:p>
-            <a:pPr marL="571680" indent="-570960">
+            <a:pPr marL="571680" indent="-570600">
               <a:lnSpc>
                 <a:spcPct val="100000"/>
               </a:lnSpc>
@@ -3955,6 +3943,7 @@
                   </a:solidFill>
                 </a:uFill>
                 <a:latin typeface="Calibri"/>
+                <a:ea typeface="DejaVu Sans"/>
               </a:rPr>
               <a:t>II.   Second lesson</a:t>
             </a:r>
@@ -4013,14 +4002,14 @@
       </p:grpSpPr>
       <p:sp>
         <p:nvSpPr>
-          <p:cNvPr id="116" name="CustomShape 1"/>
+          <p:cNvPr id="115" name="CustomShape 1"/>
           <p:cNvSpPr/>
           <p:nvPr/>
         </p:nvSpPr>
         <p:spPr>
           <a:xfrm>
             <a:off x="457200" y="1714320"/>
-            <a:ext cx="8228880" cy="4411080"/>
+            <a:ext cx="8228520" cy="4410720"/>
           </a:xfrm>
           <a:prstGeom prst="rect">
             <a:avLst/>
@@ -4039,7 +4028,7 @@
         <p:txBody>
           <a:bodyPr lIns="90000" rIns="90000" tIns="45000" bIns="45000"/>
           <a:p>
-            <a:pPr marL="343080" indent="-342360">
+            <a:pPr marL="343080" indent="-342000">
               <a:lnSpc>
                 <a:spcPct val="100000"/>
               </a:lnSpc>
@@ -4055,13 +4044,14 @@
                   </a:solidFill>
                 </a:uFill>
                 <a:latin typeface="Calibri"/>
+                <a:ea typeface="DejaVu Sans"/>
               </a:rPr>
               <a:t>Web-services:</a:t>
             </a:r>
             <a:endParaRPr/>
           </a:p>
           <a:p>
-            <a:pPr marL="343080" indent="-342360">
+            <a:pPr marL="343080" indent="-342000">
               <a:lnSpc>
                 <a:spcPct val="100000"/>
               </a:lnSpc>
@@ -4077,13 +4067,14 @@
                   </a:solidFill>
                 </a:uFill>
                 <a:latin typeface="Calibri"/>
+                <a:ea typeface="DejaVu Sans"/>
               </a:rPr>
               <a:t>from our mock-ups, we have defined our necessary web services for loading data.</a:t>
             </a:r>
             <a:endParaRPr/>
           </a:p>
           <a:p>
-            <a:pPr marL="343080" indent="-342360">
+            <a:pPr marL="343080" indent="-342000">
               <a:lnSpc>
                 <a:spcPct val="100000"/>
               </a:lnSpc>
@@ -4099,6 +4090,7 @@
                   </a:solidFill>
                 </a:uFill>
                 <a:latin typeface="Calibri"/>
+                <a:ea typeface="DejaVu Sans"/>
               </a:rPr>
               <a:t>This is the web-services for our </a:t>
             </a:r>
@@ -4113,157 +4105,158 @@
                   </a:solidFill>
                 </a:uFill>
                 <a:latin typeface="Calibri"/>
+                <a:ea typeface="DejaVu Sans"/>
               </a:rPr>
               <a:t>home page.</a:t>
             </a:r>
             <a:endParaRPr/>
           </a:p>
           <a:p>
-            <a:pPr marL="343080" indent="-342360">
-              <a:lnSpc>
-                <a:spcPct val="100000"/>
-              </a:lnSpc>
-            </a:pPr>
-            <a:endParaRPr/>
-          </a:p>
-          <a:p>
-            <a:pPr marL="343080" indent="-342360">
-              <a:lnSpc>
-                <a:spcPct val="100000"/>
-              </a:lnSpc>
-            </a:pPr>
-            <a:endParaRPr/>
-          </a:p>
-          <a:p>
-            <a:pPr marL="343080" indent="-342360">
-              <a:lnSpc>
-                <a:spcPct val="100000"/>
-              </a:lnSpc>
-            </a:pPr>
-            <a:endParaRPr/>
-          </a:p>
-          <a:p>
-            <a:pPr marL="343080" indent="-342360">
-              <a:lnSpc>
-                <a:spcPct val="100000"/>
-              </a:lnSpc>
-            </a:pPr>
-            <a:endParaRPr/>
-          </a:p>
-          <a:p>
-            <a:pPr marL="343080" indent="-342360">
-              <a:lnSpc>
-                <a:spcPct val="100000"/>
-              </a:lnSpc>
-            </a:pPr>
-            <a:endParaRPr/>
-          </a:p>
-          <a:p>
-            <a:pPr marL="343080" indent="-342360">
-              <a:lnSpc>
-                <a:spcPct val="100000"/>
-              </a:lnSpc>
-            </a:pPr>
-            <a:endParaRPr/>
-          </a:p>
-          <a:p>
-            <a:pPr marL="343080" indent="-342360">
-              <a:lnSpc>
-                <a:spcPct val="100000"/>
-              </a:lnSpc>
-            </a:pPr>
-            <a:endParaRPr/>
-          </a:p>
-          <a:p>
-            <a:pPr marL="343080" indent="-342360">
-              <a:lnSpc>
-                <a:spcPct val="100000"/>
-              </a:lnSpc>
-            </a:pPr>
-            <a:endParaRPr/>
-          </a:p>
-          <a:p>
-            <a:pPr marL="343080" indent="-342360">
-              <a:lnSpc>
-                <a:spcPct val="100000"/>
-              </a:lnSpc>
-            </a:pPr>
-            <a:endParaRPr/>
-          </a:p>
-          <a:p>
-            <a:pPr marL="343080" indent="-342360">
-              <a:lnSpc>
-                <a:spcPct val="100000"/>
-              </a:lnSpc>
-            </a:pPr>
-            <a:endParaRPr/>
-          </a:p>
-          <a:p>
-            <a:pPr marL="343080" indent="-342360">
-              <a:lnSpc>
-                <a:spcPct val="100000"/>
-              </a:lnSpc>
-            </a:pPr>
-            <a:endParaRPr/>
-          </a:p>
-          <a:p>
-            <a:pPr marL="343080" indent="-342360">
-              <a:lnSpc>
-                <a:spcPct val="100000"/>
-              </a:lnSpc>
-            </a:pPr>
-            <a:endParaRPr/>
-          </a:p>
-          <a:p>
-            <a:pPr marL="343080" indent="-342360">
-              <a:lnSpc>
-                <a:spcPct val="100000"/>
-              </a:lnSpc>
-            </a:pPr>
-            <a:endParaRPr/>
-          </a:p>
-          <a:p>
-            <a:pPr marL="343080" indent="-342360">
-              <a:lnSpc>
-                <a:spcPct val="100000"/>
-              </a:lnSpc>
-            </a:pPr>
-            <a:endParaRPr/>
-          </a:p>
-          <a:p>
-            <a:pPr marL="343080" indent="-342360">
-              <a:lnSpc>
-                <a:spcPct val="100000"/>
-              </a:lnSpc>
-            </a:pPr>
-            <a:endParaRPr/>
-          </a:p>
-          <a:p>
-            <a:pPr marL="343080" indent="-342360">
-              <a:lnSpc>
-                <a:spcPct val="100000"/>
-              </a:lnSpc>
-            </a:pPr>
-            <a:endParaRPr/>
-          </a:p>
-          <a:p>
-            <a:pPr marL="343080" indent="-342360">
-              <a:lnSpc>
-                <a:spcPct val="100000"/>
-              </a:lnSpc>
-            </a:pPr>
-            <a:endParaRPr/>
-          </a:p>
-          <a:p>
-            <a:pPr marL="343080" indent="-342360">
-              <a:lnSpc>
-                <a:spcPct val="100000"/>
-              </a:lnSpc>
-            </a:pPr>
-            <a:endParaRPr/>
-          </a:p>
-          <a:p>
-            <a:pPr marL="343080" indent="-342360">
+            <a:pPr marL="343080" indent="-342000">
+              <a:lnSpc>
+                <a:spcPct val="100000"/>
+              </a:lnSpc>
+            </a:pPr>
+            <a:endParaRPr/>
+          </a:p>
+          <a:p>
+            <a:pPr marL="343080" indent="-342000">
+              <a:lnSpc>
+                <a:spcPct val="100000"/>
+              </a:lnSpc>
+            </a:pPr>
+            <a:endParaRPr/>
+          </a:p>
+          <a:p>
+            <a:pPr marL="343080" indent="-342000">
+              <a:lnSpc>
+                <a:spcPct val="100000"/>
+              </a:lnSpc>
+            </a:pPr>
+            <a:endParaRPr/>
+          </a:p>
+          <a:p>
+            <a:pPr marL="343080" indent="-342000">
+              <a:lnSpc>
+                <a:spcPct val="100000"/>
+              </a:lnSpc>
+            </a:pPr>
+            <a:endParaRPr/>
+          </a:p>
+          <a:p>
+            <a:pPr marL="343080" indent="-342000">
+              <a:lnSpc>
+                <a:spcPct val="100000"/>
+              </a:lnSpc>
+            </a:pPr>
+            <a:endParaRPr/>
+          </a:p>
+          <a:p>
+            <a:pPr marL="343080" indent="-342000">
+              <a:lnSpc>
+                <a:spcPct val="100000"/>
+              </a:lnSpc>
+            </a:pPr>
+            <a:endParaRPr/>
+          </a:p>
+          <a:p>
+            <a:pPr marL="343080" indent="-342000">
+              <a:lnSpc>
+                <a:spcPct val="100000"/>
+              </a:lnSpc>
+            </a:pPr>
+            <a:endParaRPr/>
+          </a:p>
+          <a:p>
+            <a:pPr marL="343080" indent="-342000">
+              <a:lnSpc>
+                <a:spcPct val="100000"/>
+              </a:lnSpc>
+            </a:pPr>
+            <a:endParaRPr/>
+          </a:p>
+          <a:p>
+            <a:pPr marL="343080" indent="-342000">
+              <a:lnSpc>
+                <a:spcPct val="100000"/>
+              </a:lnSpc>
+            </a:pPr>
+            <a:endParaRPr/>
+          </a:p>
+          <a:p>
+            <a:pPr marL="343080" indent="-342000">
+              <a:lnSpc>
+                <a:spcPct val="100000"/>
+              </a:lnSpc>
+            </a:pPr>
+            <a:endParaRPr/>
+          </a:p>
+          <a:p>
+            <a:pPr marL="343080" indent="-342000">
+              <a:lnSpc>
+                <a:spcPct val="100000"/>
+              </a:lnSpc>
+            </a:pPr>
+            <a:endParaRPr/>
+          </a:p>
+          <a:p>
+            <a:pPr marL="343080" indent="-342000">
+              <a:lnSpc>
+                <a:spcPct val="100000"/>
+              </a:lnSpc>
+            </a:pPr>
+            <a:endParaRPr/>
+          </a:p>
+          <a:p>
+            <a:pPr marL="343080" indent="-342000">
+              <a:lnSpc>
+                <a:spcPct val="100000"/>
+              </a:lnSpc>
+            </a:pPr>
+            <a:endParaRPr/>
+          </a:p>
+          <a:p>
+            <a:pPr marL="343080" indent="-342000">
+              <a:lnSpc>
+                <a:spcPct val="100000"/>
+              </a:lnSpc>
+            </a:pPr>
+            <a:endParaRPr/>
+          </a:p>
+          <a:p>
+            <a:pPr marL="343080" indent="-342000">
+              <a:lnSpc>
+                <a:spcPct val="100000"/>
+              </a:lnSpc>
+            </a:pPr>
+            <a:endParaRPr/>
+          </a:p>
+          <a:p>
+            <a:pPr marL="343080" indent="-342000">
+              <a:lnSpc>
+                <a:spcPct val="100000"/>
+              </a:lnSpc>
+            </a:pPr>
+            <a:endParaRPr/>
+          </a:p>
+          <a:p>
+            <a:pPr marL="343080" indent="-342000">
+              <a:lnSpc>
+                <a:spcPct val="100000"/>
+              </a:lnSpc>
+            </a:pPr>
+            <a:endParaRPr/>
+          </a:p>
+          <a:p>
+            <a:pPr marL="343080" indent="-342000">
+              <a:lnSpc>
+                <a:spcPct val="100000"/>
+              </a:lnSpc>
+            </a:pPr>
+            <a:endParaRPr/>
+          </a:p>
+          <a:p>
+            <a:pPr marL="343080" indent="-342000">
               <a:lnSpc>
                 <a:spcPct val="100000"/>
               </a:lnSpc>
@@ -4274,14 +4267,14 @@
       </p:sp>
       <p:sp>
         <p:nvSpPr>
-          <p:cNvPr id="117" name="CustomShape 2"/>
+          <p:cNvPr id="116" name="CustomShape 2"/>
           <p:cNvSpPr/>
           <p:nvPr/>
         </p:nvSpPr>
         <p:spPr>
           <a:xfrm>
             <a:off x="0" y="6572160"/>
-            <a:ext cx="785160" cy="285120"/>
+            <a:ext cx="784800" cy="284760"/>
           </a:xfrm>
           <a:prstGeom prst="rect">
             <a:avLst/>
@@ -4313,14 +4306,14 @@
       </p:sp>
       <p:sp>
         <p:nvSpPr>
-          <p:cNvPr id="118" name="CustomShape 3"/>
+          <p:cNvPr id="117" name="CustomShape 3"/>
           <p:cNvSpPr/>
           <p:nvPr/>
         </p:nvSpPr>
         <p:spPr>
           <a:xfrm>
             <a:off x="428760" y="642960"/>
-            <a:ext cx="8257320" cy="785160"/>
+            <a:ext cx="8256960" cy="784800"/>
           </a:xfrm>
           <a:prstGeom prst="rect">
             <a:avLst/>
@@ -4339,7 +4332,7 @@
         <p:txBody>
           <a:bodyPr lIns="90000" rIns="90000" tIns="45000" bIns="45000" anchor="ctr"/>
           <a:p>
-            <a:pPr marL="571680" indent="-570960">
+            <a:pPr marL="571680" indent="-570600">
               <a:lnSpc>
                 <a:spcPct val="100000"/>
               </a:lnSpc>
@@ -4355,6 +4348,7 @@
                   </a:solidFill>
                 </a:uFill>
                 <a:latin typeface="Calibri"/>
+                <a:ea typeface="DejaVu Sans"/>
               </a:rPr>
               <a:t>II.   Second lesson</a:t>
             </a:r>
@@ -4364,7 +4358,7 @@
       </p:sp>
       <p:pic>
         <p:nvPicPr>
-          <p:cNvPr id="119" name="Shape 81" descr=""/>
+          <p:cNvPr id="118" name="Shape 81" descr=""/>
           <p:cNvPicPr/>
           <p:nvPr/>
         </p:nvPicPr>
@@ -4375,7 +4369,7 @@
         <p:spPr>
           <a:xfrm>
             <a:off x="0" y="2571840"/>
-            <a:ext cx="9143280" cy="3912840"/>
+            <a:ext cx="9142920" cy="3912480"/>
           </a:xfrm>
           <a:prstGeom prst="rect">
             <a:avLst/>
@@ -4436,14 +4430,14 @@
       </p:grpSpPr>
       <p:sp>
         <p:nvSpPr>
-          <p:cNvPr id="120" name="CustomShape 1"/>
+          <p:cNvPr id="119" name="CustomShape 1"/>
           <p:cNvSpPr/>
           <p:nvPr/>
         </p:nvSpPr>
         <p:spPr>
           <a:xfrm>
             <a:off x="457200" y="1714320"/>
-            <a:ext cx="8228880" cy="4411080"/>
+            <a:ext cx="8228520" cy="4410720"/>
           </a:xfrm>
           <a:prstGeom prst="rect">
             <a:avLst/>
@@ -4462,7 +4456,7 @@
         <p:txBody>
           <a:bodyPr lIns="90000" rIns="90000" tIns="45000" bIns="45000"/>
           <a:p>
-            <a:pPr marL="343080" indent="-342360">
+            <a:pPr marL="343080" indent="-342000">
               <a:lnSpc>
                 <a:spcPct val="100000"/>
               </a:lnSpc>
@@ -4478,13 +4472,14 @@
                   </a:solidFill>
                 </a:uFill>
                 <a:latin typeface="Calibri"/>
+                <a:ea typeface="DejaVu Sans"/>
               </a:rPr>
               <a:t>Web-services:</a:t>
             </a:r>
             <a:endParaRPr/>
           </a:p>
           <a:p>
-            <a:pPr marL="343080" indent="-342360">
+            <a:pPr marL="343080" indent="-342000">
               <a:lnSpc>
                 <a:spcPct val="100000"/>
               </a:lnSpc>
@@ -4500,6 +4495,7 @@
                   </a:solidFill>
                 </a:uFill>
                 <a:latin typeface="Calibri"/>
+                <a:ea typeface="DejaVu Sans"/>
               </a:rPr>
               <a:t>This is the web-services for our </a:t>
             </a:r>
@@ -4514,125 +4510,126 @@
                   </a:solidFill>
                 </a:uFill>
                 <a:latin typeface="Calibri"/>
+                <a:ea typeface="DejaVu Sans"/>
               </a:rPr>
               <a:t>members page.</a:t>
             </a:r>
             <a:endParaRPr/>
           </a:p>
           <a:p>
-            <a:pPr marL="343080" indent="-342360">
-              <a:lnSpc>
-                <a:spcPct val="100000"/>
-              </a:lnSpc>
-            </a:pPr>
-            <a:endParaRPr/>
-          </a:p>
-          <a:p>
-            <a:pPr marL="343080" indent="-342360">
-              <a:lnSpc>
-                <a:spcPct val="100000"/>
-              </a:lnSpc>
-            </a:pPr>
-            <a:endParaRPr/>
-          </a:p>
-          <a:p>
-            <a:pPr marL="343080" indent="-342360">
-              <a:lnSpc>
-                <a:spcPct val="100000"/>
-              </a:lnSpc>
-            </a:pPr>
-            <a:endParaRPr/>
-          </a:p>
-          <a:p>
-            <a:pPr marL="343080" indent="-342360">
-              <a:lnSpc>
-                <a:spcPct val="100000"/>
-              </a:lnSpc>
-            </a:pPr>
-            <a:endParaRPr/>
-          </a:p>
-          <a:p>
-            <a:pPr marL="343080" indent="-342360">
-              <a:lnSpc>
-                <a:spcPct val="100000"/>
-              </a:lnSpc>
-            </a:pPr>
-            <a:endParaRPr/>
-          </a:p>
-          <a:p>
-            <a:pPr marL="343080" indent="-342360">
-              <a:lnSpc>
-                <a:spcPct val="100000"/>
-              </a:lnSpc>
-            </a:pPr>
-            <a:endParaRPr/>
-          </a:p>
-          <a:p>
-            <a:pPr marL="343080" indent="-342360">
-              <a:lnSpc>
-                <a:spcPct val="100000"/>
-              </a:lnSpc>
-            </a:pPr>
-            <a:endParaRPr/>
-          </a:p>
-          <a:p>
-            <a:pPr marL="343080" indent="-342360">
-              <a:lnSpc>
-                <a:spcPct val="100000"/>
-              </a:lnSpc>
-            </a:pPr>
-            <a:endParaRPr/>
-          </a:p>
-          <a:p>
-            <a:pPr marL="343080" indent="-342360">
-              <a:lnSpc>
-                <a:spcPct val="100000"/>
-              </a:lnSpc>
-            </a:pPr>
-            <a:endParaRPr/>
-          </a:p>
-          <a:p>
-            <a:pPr marL="343080" indent="-342360">
-              <a:lnSpc>
-                <a:spcPct val="100000"/>
-              </a:lnSpc>
-            </a:pPr>
-            <a:endParaRPr/>
-          </a:p>
-          <a:p>
-            <a:pPr marL="343080" indent="-342360">
-              <a:lnSpc>
-                <a:spcPct val="100000"/>
-              </a:lnSpc>
-            </a:pPr>
-            <a:endParaRPr/>
-          </a:p>
-          <a:p>
-            <a:pPr marL="343080" indent="-342360">
-              <a:lnSpc>
-                <a:spcPct val="100000"/>
-              </a:lnSpc>
-            </a:pPr>
-            <a:endParaRPr/>
-          </a:p>
-          <a:p>
-            <a:pPr marL="343080" indent="-342360">
-              <a:lnSpc>
-                <a:spcPct val="100000"/>
-              </a:lnSpc>
-            </a:pPr>
-            <a:endParaRPr/>
-          </a:p>
-          <a:p>
-            <a:pPr marL="343080" indent="-342360">
-              <a:lnSpc>
-                <a:spcPct val="100000"/>
-              </a:lnSpc>
-            </a:pPr>
-            <a:endParaRPr/>
-          </a:p>
-          <a:p>
-            <a:pPr marL="343080" indent="-342360">
+            <a:pPr marL="343080" indent="-342000">
+              <a:lnSpc>
+                <a:spcPct val="100000"/>
+              </a:lnSpc>
+            </a:pPr>
+            <a:endParaRPr/>
+          </a:p>
+          <a:p>
+            <a:pPr marL="343080" indent="-342000">
+              <a:lnSpc>
+                <a:spcPct val="100000"/>
+              </a:lnSpc>
+            </a:pPr>
+            <a:endParaRPr/>
+          </a:p>
+          <a:p>
+            <a:pPr marL="343080" indent="-342000">
+              <a:lnSpc>
+                <a:spcPct val="100000"/>
+              </a:lnSpc>
+            </a:pPr>
+            <a:endParaRPr/>
+          </a:p>
+          <a:p>
+            <a:pPr marL="343080" indent="-342000">
+              <a:lnSpc>
+                <a:spcPct val="100000"/>
+              </a:lnSpc>
+            </a:pPr>
+            <a:endParaRPr/>
+          </a:p>
+          <a:p>
+            <a:pPr marL="343080" indent="-342000">
+              <a:lnSpc>
+                <a:spcPct val="100000"/>
+              </a:lnSpc>
+            </a:pPr>
+            <a:endParaRPr/>
+          </a:p>
+          <a:p>
+            <a:pPr marL="343080" indent="-342000">
+              <a:lnSpc>
+                <a:spcPct val="100000"/>
+              </a:lnSpc>
+            </a:pPr>
+            <a:endParaRPr/>
+          </a:p>
+          <a:p>
+            <a:pPr marL="343080" indent="-342000">
+              <a:lnSpc>
+                <a:spcPct val="100000"/>
+              </a:lnSpc>
+            </a:pPr>
+            <a:endParaRPr/>
+          </a:p>
+          <a:p>
+            <a:pPr marL="343080" indent="-342000">
+              <a:lnSpc>
+                <a:spcPct val="100000"/>
+              </a:lnSpc>
+            </a:pPr>
+            <a:endParaRPr/>
+          </a:p>
+          <a:p>
+            <a:pPr marL="343080" indent="-342000">
+              <a:lnSpc>
+                <a:spcPct val="100000"/>
+              </a:lnSpc>
+            </a:pPr>
+            <a:endParaRPr/>
+          </a:p>
+          <a:p>
+            <a:pPr marL="343080" indent="-342000">
+              <a:lnSpc>
+                <a:spcPct val="100000"/>
+              </a:lnSpc>
+            </a:pPr>
+            <a:endParaRPr/>
+          </a:p>
+          <a:p>
+            <a:pPr marL="343080" indent="-342000">
+              <a:lnSpc>
+                <a:spcPct val="100000"/>
+              </a:lnSpc>
+            </a:pPr>
+            <a:endParaRPr/>
+          </a:p>
+          <a:p>
+            <a:pPr marL="343080" indent="-342000">
+              <a:lnSpc>
+                <a:spcPct val="100000"/>
+              </a:lnSpc>
+            </a:pPr>
+            <a:endParaRPr/>
+          </a:p>
+          <a:p>
+            <a:pPr marL="343080" indent="-342000">
+              <a:lnSpc>
+                <a:spcPct val="100000"/>
+              </a:lnSpc>
+            </a:pPr>
+            <a:endParaRPr/>
+          </a:p>
+          <a:p>
+            <a:pPr marL="343080" indent="-342000">
+              <a:lnSpc>
+                <a:spcPct val="100000"/>
+              </a:lnSpc>
+            </a:pPr>
+            <a:endParaRPr/>
+          </a:p>
+          <a:p>
+            <a:pPr marL="343080" indent="-342000">
               <a:lnSpc>
                 <a:spcPct val="100000"/>
               </a:lnSpc>
@@ -4648,53 +4645,54 @@
                   </a:solidFill>
                 </a:uFill>
                 <a:latin typeface="Calibri"/>
+                <a:ea typeface="DejaVu Sans"/>
               </a:rPr>
               <a:t>Every Web-service has his type, url and behavior as the board shows. </a:t>
             </a:r>
             <a:endParaRPr/>
           </a:p>
           <a:p>
-            <a:pPr marL="343080" indent="-342360">
-              <a:lnSpc>
-                <a:spcPct val="100000"/>
-              </a:lnSpc>
-            </a:pPr>
-            <a:endParaRPr/>
-          </a:p>
-          <a:p>
-            <a:pPr marL="343080" indent="-342360">
-              <a:lnSpc>
-                <a:spcPct val="100000"/>
-              </a:lnSpc>
-            </a:pPr>
-            <a:endParaRPr/>
-          </a:p>
-          <a:p>
-            <a:pPr marL="343080" indent="-342360">
-              <a:lnSpc>
-                <a:spcPct val="100000"/>
-              </a:lnSpc>
-            </a:pPr>
-            <a:endParaRPr/>
-          </a:p>
-          <a:p>
-            <a:pPr marL="343080" indent="-342360">
-              <a:lnSpc>
-                <a:spcPct val="100000"/>
-              </a:lnSpc>
-            </a:pPr>
-            <a:endParaRPr/>
-          </a:p>
-          <a:p>
-            <a:pPr marL="343080" indent="-342360">
-              <a:lnSpc>
-                <a:spcPct val="100000"/>
-              </a:lnSpc>
-            </a:pPr>
-            <a:endParaRPr/>
-          </a:p>
-          <a:p>
-            <a:pPr marL="343080" indent="-342360">
+            <a:pPr marL="343080" indent="-342000">
+              <a:lnSpc>
+                <a:spcPct val="100000"/>
+              </a:lnSpc>
+            </a:pPr>
+            <a:endParaRPr/>
+          </a:p>
+          <a:p>
+            <a:pPr marL="343080" indent="-342000">
+              <a:lnSpc>
+                <a:spcPct val="100000"/>
+              </a:lnSpc>
+            </a:pPr>
+            <a:endParaRPr/>
+          </a:p>
+          <a:p>
+            <a:pPr marL="343080" indent="-342000">
+              <a:lnSpc>
+                <a:spcPct val="100000"/>
+              </a:lnSpc>
+            </a:pPr>
+            <a:endParaRPr/>
+          </a:p>
+          <a:p>
+            <a:pPr marL="343080" indent="-342000">
+              <a:lnSpc>
+                <a:spcPct val="100000"/>
+              </a:lnSpc>
+            </a:pPr>
+            <a:endParaRPr/>
+          </a:p>
+          <a:p>
+            <a:pPr marL="343080" indent="-342000">
+              <a:lnSpc>
+                <a:spcPct val="100000"/>
+              </a:lnSpc>
+            </a:pPr>
+            <a:endParaRPr/>
+          </a:p>
+          <a:p>
+            <a:pPr marL="343080" indent="-342000">
               <a:lnSpc>
                 <a:spcPct val="100000"/>
               </a:lnSpc>
@@ -4705,14 +4703,14 @@
       </p:sp>
       <p:sp>
         <p:nvSpPr>
-          <p:cNvPr id="121" name="CustomShape 2"/>
+          <p:cNvPr id="120" name="CustomShape 2"/>
           <p:cNvSpPr/>
           <p:nvPr/>
         </p:nvSpPr>
         <p:spPr>
           <a:xfrm>
             <a:off x="0" y="6572160"/>
-            <a:ext cx="785160" cy="285120"/>
+            <a:ext cx="784800" cy="284760"/>
           </a:xfrm>
           <a:prstGeom prst="rect">
             <a:avLst/>
@@ -4744,14 +4742,14 @@
       </p:sp>
       <p:sp>
         <p:nvSpPr>
-          <p:cNvPr id="122" name="CustomShape 3"/>
+          <p:cNvPr id="121" name="CustomShape 3"/>
           <p:cNvSpPr/>
           <p:nvPr/>
         </p:nvSpPr>
         <p:spPr>
           <a:xfrm>
             <a:off x="428760" y="642960"/>
-            <a:ext cx="8257320" cy="785160"/>
+            <a:ext cx="8256960" cy="784800"/>
           </a:xfrm>
           <a:prstGeom prst="rect">
             <a:avLst/>
@@ -4770,7 +4768,7 @@
         <p:txBody>
           <a:bodyPr lIns="90000" rIns="90000" tIns="45000" bIns="45000" anchor="ctr"/>
           <a:p>
-            <a:pPr marL="571680" indent="-570960">
+            <a:pPr marL="571680" indent="-570600">
               <a:lnSpc>
                 <a:spcPct val="100000"/>
               </a:lnSpc>
@@ -4786,6 +4784,7 @@
                   </a:solidFill>
                 </a:uFill>
                 <a:latin typeface="Calibri"/>
+                <a:ea typeface="DejaVu Sans"/>
               </a:rPr>
               <a:t>II.   Second lesson</a:t>
             </a:r>
@@ -4795,7 +4794,7 @@
       </p:sp>
       <p:graphicFrame>
         <p:nvGraphicFramePr>
-          <p:cNvPr id="123" name="Table 4"/>
+          <p:cNvPr id="122" name="Table 4"/>
           <p:cNvGraphicFramePr/>
           <p:nvPr/>
         </p:nvGraphicFramePr>
@@ -6135,14 +6134,14 @@
       </p:grpSpPr>
       <p:sp>
         <p:nvSpPr>
-          <p:cNvPr id="124" name="CustomShape 1"/>
+          <p:cNvPr id="123" name="CustomShape 1"/>
           <p:cNvSpPr/>
           <p:nvPr/>
         </p:nvSpPr>
         <p:spPr>
           <a:xfrm>
             <a:off x="457200" y="1714320"/>
-            <a:ext cx="8228880" cy="4411080"/>
+            <a:ext cx="8228520" cy="4410720"/>
           </a:xfrm>
           <a:prstGeom prst="rect">
             <a:avLst/>
@@ -6161,7 +6160,7 @@
         <p:txBody>
           <a:bodyPr lIns="90000" rIns="90000" tIns="45000" bIns="45000"/>
           <a:p>
-            <a:pPr marL="343080" indent="-342360">
+            <a:pPr marL="343080" indent="-342000">
               <a:lnSpc>
                 <a:spcPct val="100000"/>
               </a:lnSpc>
@@ -6177,13 +6176,14 @@
                   </a:solidFill>
                 </a:uFill>
                 <a:latin typeface="Calibri"/>
+                <a:ea typeface="DejaVu Sans"/>
               </a:rPr>
               <a:t>Web-services:</a:t>
             </a:r>
             <a:endParaRPr/>
           </a:p>
           <a:p>
-            <a:pPr marL="343080" indent="-342360">
+            <a:pPr marL="343080" indent="-342000">
               <a:lnSpc>
                 <a:spcPct val="100000"/>
               </a:lnSpc>
@@ -6199,6 +6199,7 @@
                   </a:solidFill>
                 </a:uFill>
                 <a:latin typeface="Calibri"/>
+                <a:ea typeface="DejaVu Sans"/>
               </a:rPr>
               <a:t>This is the web-services for our </a:t>
             </a:r>
@@ -6213,125 +6214,126 @@
                   </a:solidFill>
                 </a:uFill>
                 <a:latin typeface="Calibri"/>
+                <a:ea typeface="DejaVu Sans"/>
               </a:rPr>
               <a:t>flight page.</a:t>
             </a:r>
             <a:endParaRPr/>
           </a:p>
           <a:p>
-            <a:pPr marL="343080" indent="-342360">
-              <a:lnSpc>
-                <a:spcPct val="100000"/>
-              </a:lnSpc>
-            </a:pPr>
-            <a:endParaRPr/>
-          </a:p>
-          <a:p>
-            <a:pPr marL="343080" indent="-342360">
-              <a:lnSpc>
-                <a:spcPct val="100000"/>
-              </a:lnSpc>
-            </a:pPr>
-            <a:endParaRPr/>
-          </a:p>
-          <a:p>
-            <a:pPr marL="343080" indent="-342360">
-              <a:lnSpc>
-                <a:spcPct val="100000"/>
-              </a:lnSpc>
-            </a:pPr>
-            <a:endParaRPr/>
-          </a:p>
-          <a:p>
-            <a:pPr marL="343080" indent="-342360">
-              <a:lnSpc>
-                <a:spcPct val="100000"/>
-              </a:lnSpc>
-            </a:pPr>
-            <a:endParaRPr/>
-          </a:p>
-          <a:p>
-            <a:pPr marL="343080" indent="-342360">
-              <a:lnSpc>
-                <a:spcPct val="100000"/>
-              </a:lnSpc>
-            </a:pPr>
-            <a:endParaRPr/>
-          </a:p>
-          <a:p>
-            <a:pPr marL="343080" indent="-342360">
-              <a:lnSpc>
-                <a:spcPct val="100000"/>
-              </a:lnSpc>
-            </a:pPr>
-            <a:endParaRPr/>
-          </a:p>
-          <a:p>
-            <a:pPr marL="343080" indent="-342360">
-              <a:lnSpc>
-                <a:spcPct val="100000"/>
-              </a:lnSpc>
-            </a:pPr>
-            <a:endParaRPr/>
-          </a:p>
-          <a:p>
-            <a:pPr marL="343080" indent="-342360">
-              <a:lnSpc>
-                <a:spcPct val="100000"/>
-              </a:lnSpc>
-            </a:pPr>
-            <a:endParaRPr/>
-          </a:p>
-          <a:p>
-            <a:pPr marL="343080" indent="-342360">
-              <a:lnSpc>
-                <a:spcPct val="100000"/>
-              </a:lnSpc>
-            </a:pPr>
-            <a:endParaRPr/>
-          </a:p>
-          <a:p>
-            <a:pPr marL="343080" indent="-342360">
-              <a:lnSpc>
-                <a:spcPct val="100000"/>
-              </a:lnSpc>
-            </a:pPr>
-            <a:endParaRPr/>
-          </a:p>
-          <a:p>
-            <a:pPr marL="343080" indent="-342360">
-              <a:lnSpc>
-                <a:spcPct val="100000"/>
-              </a:lnSpc>
-            </a:pPr>
-            <a:endParaRPr/>
-          </a:p>
-          <a:p>
-            <a:pPr marL="343080" indent="-342360">
-              <a:lnSpc>
-                <a:spcPct val="100000"/>
-              </a:lnSpc>
-            </a:pPr>
-            <a:endParaRPr/>
-          </a:p>
-          <a:p>
-            <a:pPr marL="343080" indent="-342360">
-              <a:lnSpc>
-                <a:spcPct val="100000"/>
-              </a:lnSpc>
-            </a:pPr>
-            <a:endParaRPr/>
-          </a:p>
-          <a:p>
-            <a:pPr marL="343080" indent="-342360">
-              <a:lnSpc>
-                <a:spcPct val="100000"/>
-              </a:lnSpc>
-            </a:pPr>
-            <a:endParaRPr/>
-          </a:p>
-          <a:p>
-            <a:pPr marL="343080" indent="-342360">
+            <a:pPr marL="343080" indent="-342000">
+              <a:lnSpc>
+                <a:spcPct val="100000"/>
+              </a:lnSpc>
+            </a:pPr>
+            <a:endParaRPr/>
+          </a:p>
+          <a:p>
+            <a:pPr marL="343080" indent="-342000">
+              <a:lnSpc>
+                <a:spcPct val="100000"/>
+              </a:lnSpc>
+            </a:pPr>
+            <a:endParaRPr/>
+          </a:p>
+          <a:p>
+            <a:pPr marL="343080" indent="-342000">
+              <a:lnSpc>
+                <a:spcPct val="100000"/>
+              </a:lnSpc>
+            </a:pPr>
+            <a:endParaRPr/>
+          </a:p>
+          <a:p>
+            <a:pPr marL="343080" indent="-342000">
+              <a:lnSpc>
+                <a:spcPct val="100000"/>
+              </a:lnSpc>
+            </a:pPr>
+            <a:endParaRPr/>
+          </a:p>
+          <a:p>
+            <a:pPr marL="343080" indent="-342000">
+              <a:lnSpc>
+                <a:spcPct val="100000"/>
+              </a:lnSpc>
+            </a:pPr>
+            <a:endParaRPr/>
+          </a:p>
+          <a:p>
+            <a:pPr marL="343080" indent="-342000">
+              <a:lnSpc>
+                <a:spcPct val="100000"/>
+              </a:lnSpc>
+            </a:pPr>
+            <a:endParaRPr/>
+          </a:p>
+          <a:p>
+            <a:pPr marL="343080" indent="-342000">
+              <a:lnSpc>
+                <a:spcPct val="100000"/>
+              </a:lnSpc>
+            </a:pPr>
+            <a:endParaRPr/>
+          </a:p>
+          <a:p>
+            <a:pPr marL="343080" indent="-342000">
+              <a:lnSpc>
+                <a:spcPct val="100000"/>
+              </a:lnSpc>
+            </a:pPr>
+            <a:endParaRPr/>
+          </a:p>
+          <a:p>
+            <a:pPr marL="343080" indent="-342000">
+              <a:lnSpc>
+                <a:spcPct val="100000"/>
+              </a:lnSpc>
+            </a:pPr>
+            <a:endParaRPr/>
+          </a:p>
+          <a:p>
+            <a:pPr marL="343080" indent="-342000">
+              <a:lnSpc>
+                <a:spcPct val="100000"/>
+              </a:lnSpc>
+            </a:pPr>
+            <a:endParaRPr/>
+          </a:p>
+          <a:p>
+            <a:pPr marL="343080" indent="-342000">
+              <a:lnSpc>
+                <a:spcPct val="100000"/>
+              </a:lnSpc>
+            </a:pPr>
+            <a:endParaRPr/>
+          </a:p>
+          <a:p>
+            <a:pPr marL="343080" indent="-342000">
+              <a:lnSpc>
+                <a:spcPct val="100000"/>
+              </a:lnSpc>
+            </a:pPr>
+            <a:endParaRPr/>
+          </a:p>
+          <a:p>
+            <a:pPr marL="343080" indent="-342000">
+              <a:lnSpc>
+                <a:spcPct val="100000"/>
+              </a:lnSpc>
+            </a:pPr>
+            <a:endParaRPr/>
+          </a:p>
+          <a:p>
+            <a:pPr marL="343080" indent="-342000">
+              <a:lnSpc>
+                <a:spcPct val="100000"/>
+              </a:lnSpc>
+            </a:pPr>
+            <a:endParaRPr/>
+          </a:p>
+          <a:p>
+            <a:pPr marL="343080" indent="-342000">
               <a:lnSpc>
                 <a:spcPct val="100000"/>
               </a:lnSpc>
@@ -6347,53 +6349,54 @@
                   </a:solidFill>
                 </a:uFill>
                 <a:latin typeface="Calibri"/>
+                <a:ea typeface="DejaVu Sans"/>
               </a:rPr>
               <a:t>Every Web-service has his type, url and behavior as the board shows. </a:t>
             </a:r>
             <a:endParaRPr/>
           </a:p>
           <a:p>
-            <a:pPr marL="343080" indent="-342360">
-              <a:lnSpc>
-                <a:spcPct val="100000"/>
-              </a:lnSpc>
-            </a:pPr>
-            <a:endParaRPr/>
-          </a:p>
-          <a:p>
-            <a:pPr marL="343080" indent="-342360">
-              <a:lnSpc>
-                <a:spcPct val="100000"/>
-              </a:lnSpc>
-            </a:pPr>
-            <a:endParaRPr/>
-          </a:p>
-          <a:p>
-            <a:pPr marL="343080" indent="-342360">
-              <a:lnSpc>
-                <a:spcPct val="100000"/>
-              </a:lnSpc>
-            </a:pPr>
-            <a:endParaRPr/>
-          </a:p>
-          <a:p>
-            <a:pPr marL="343080" indent="-342360">
-              <a:lnSpc>
-                <a:spcPct val="100000"/>
-              </a:lnSpc>
-            </a:pPr>
-            <a:endParaRPr/>
-          </a:p>
-          <a:p>
-            <a:pPr marL="343080" indent="-342360">
-              <a:lnSpc>
-                <a:spcPct val="100000"/>
-              </a:lnSpc>
-            </a:pPr>
-            <a:endParaRPr/>
-          </a:p>
-          <a:p>
-            <a:pPr marL="343080" indent="-342360">
+            <a:pPr marL="343080" indent="-342000">
+              <a:lnSpc>
+                <a:spcPct val="100000"/>
+              </a:lnSpc>
+            </a:pPr>
+            <a:endParaRPr/>
+          </a:p>
+          <a:p>
+            <a:pPr marL="343080" indent="-342000">
+              <a:lnSpc>
+                <a:spcPct val="100000"/>
+              </a:lnSpc>
+            </a:pPr>
+            <a:endParaRPr/>
+          </a:p>
+          <a:p>
+            <a:pPr marL="343080" indent="-342000">
+              <a:lnSpc>
+                <a:spcPct val="100000"/>
+              </a:lnSpc>
+            </a:pPr>
+            <a:endParaRPr/>
+          </a:p>
+          <a:p>
+            <a:pPr marL="343080" indent="-342000">
+              <a:lnSpc>
+                <a:spcPct val="100000"/>
+              </a:lnSpc>
+            </a:pPr>
+            <a:endParaRPr/>
+          </a:p>
+          <a:p>
+            <a:pPr marL="343080" indent="-342000">
+              <a:lnSpc>
+                <a:spcPct val="100000"/>
+              </a:lnSpc>
+            </a:pPr>
+            <a:endParaRPr/>
+          </a:p>
+          <a:p>
+            <a:pPr marL="343080" indent="-342000">
               <a:lnSpc>
                 <a:spcPct val="100000"/>
               </a:lnSpc>
@@ -6404,14 +6407,14 @@
       </p:sp>
       <p:sp>
         <p:nvSpPr>
-          <p:cNvPr id="125" name="CustomShape 2"/>
+          <p:cNvPr id="124" name="CustomShape 2"/>
           <p:cNvSpPr/>
           <p:nvPr/>
         </p:nvSpPr>
         <p:spPr>
           <a:xfrm>
             <a:off x="0" y="6572160"/>
-            <a:ext cx="785160" cy="285120"/>
+            <a:ext cx="784800" cy="284760"/>
           </a:xfrm>
           <a:prstGeom prst="rect">
             <a:avLst/>
@@ -6443,14 +6446,14 @@
       </p:sp>
       <p:sp>
         <p:nvSpPr>
-          <p:cNvPr id="126" name="CustomShape 3"/>
+          <p:cNvPr id="125" name="CustomShape 3"/>
           <p:cNvSpPr/>
           <p:nvPr/>
         </p:nvSpPr>
         <p:spPr>
           <a:xfrm>
             <a:off x="428760" y="642960"/>
-            <a:ext cx="8257320" cy="785160"/>
+            <a:ext cx="8256960" cy="784800"/>
           </a:xfrm>
           <a:prstGeom prst="rect">
             <a:avLst/>
@@ -6469,7 +6472,7 @@
         <p:txBody>
           <a:bodyPr lIns="90000" rIns="90000" tIns="45000" bIns="45000" anchor="ctr"/>
           <a:p>
-            <a:pPr marL="571680" indent="-570960">
+            <a:pPr marL="571680" indent="-570600">
               <a:lnSpc>
                 <a:spcPct val="100000"/>
               </a:lnSpc>
@@ -6485,6 +6488,7 @@
                   </a:solidFill>
                 </a:uFill>
                 <a:latin typeface="Calibri"/>
+                <a:ea typeface="DejaVu Sans"/>
               </a:rPr>
               <a:t>II.   Second lesson</a:t>
             </a:r>
@@ -6494,7 +6498,7 @@
       </p:sp>
       <p:graphicFrame>
         <p:nvGraphicFramePr>
-          <p:cNvPr id="127" name="Table 4"/>
+          <p:cNvPr id="126" name="Table 4"/>
           <p:cNvGraphicFramePr/>
           <p:nvPr/>
         </p:nvGraphicFramePr>
@@ -7436,14 +7440,14 @@
       </p:grpSpPr>
       <p:sp>
         <p:nvSpPr>
-          <p:cNvPr id="128" name="CustomShape 1"/>
+          <p:cNvPr id="127" name="CustomShape 1"/>
           <p:cNvSpPr/>
           <p:nvPr/>
         </p:nvSpPr>
         <p:spPr>
           <a:xfrm>
             <a:off x="457200" y="1714320"/>
-            <a:ext cx="8228880" cy="4411080"/>
+            <a:ext cx="8228520" cy="4410720"/>
           </a:xfrm>
           <a:prstGeom prst="rect">
             <a:avLst/>
@@ -7462,14 +7466,14 @@
       </p:sp>
       <p:sp>
         <p:nvSpPr>
-          <p:cNvPr id="129" name="CustomShape 2"/>
+          <p:cNvPr id="128" name="CustomShape 2"/>
           <p:cNvSpPr/>
           <p:nvPr/>
         </p:nvSpPr>
         <p:spPr>
           <a:xfrm>
             <a:off x="0" y="6572160"/>
-            <a:ext cx="785160" cy="285120"/>
+            <a:ext cx="784800" cy="284760"/>
           </a:xfrm>
           <a:prstGeom prst="rect">
             <a:avLst/>
@@ -7501,14 +7505,14 @@
       </p:sp>
       <p:sp>
         <p:nvSpPr>
-          <p:cNvPr id="130" name="CustomShape 3"/>
+          <p:cNvPr id="129" name="CustomShape 3"/>
           <p:cNvSpPr/>
           <p:nvPr/>
         </p:nvSpPr>
         <p:spPr>
           <a:xfrm>
             <a:off x="428760" y="642960"/>
-            <a:ext cx="8257320" cy="785160"/>
+            <a:ext cx="8256960" cy="784800"/>
           </a:xfrm>
           <a:prstGeom prst="rect">
             <a:avLst/>
@@ -7527,7 +7531,7 @@
         <p:txBody>
           <a:bodyPr lIns="90000" rIns="90000" tIns="45000" bIns="45000" anchor="ctr"/>
           <a:p>
-            <a:pPr marL="571680" indent="-570960">
+            <a:pPr marL="571680" indent="-570600">
               <a:lnSpc>
                 <a:spcPct val="100000"/>
               </a:lnSpc>
@@ -7543,6 +7547,7 @@
                   </a:solidFill>
                 </a:uFill>
                 <a:latin typeface="Calibri"/>
+                <a:ea typeface="DejaVu Sans"/>
               </a:rPr>
               <a:t>III.   Third lesson</a:t>
             </a:r>
@@ -7601,14 +7606,14 @@
       </p:grpSpPr>
       <p:sp>
         <p:nvSpPr>
-          <p:cNvPr id="131" name="CustomShape 1"/>
+          <p:cNvPr id="130" name="CustomShape 1"/>
           <p:cNvSpPr/>
           <p:nvPr/>
         </p:nvSpPr>
         <p:spPr>
           <a:xfrm>
             <a:off x="457200" y="1714320"/>
-            <a:ext cx="8228880" cy="4411080"/>
+            <a:ext cx="8228520" cy="4410720"/>
           </a:xfrm>
           <a:prstGeom prst="rect">
             <a:avLst/>
@@ -7627,14 +7632,14 @@
       </p:sp>
       <p:sp>
         <p:nvSpPr>
-          <p:cNvPr id="132" name="CustomShape 2"/>
+          <p:cNvPr id="131" name="CustomShape 2"/>
           <p:cNvSpPr/>
           <p:nvPr/>
         </p:nvSpPr>
         <p:spPr>
           <a:xfrm>
             <a:off x="0" y="6572160"/>
-            <a:ext cx="785160" cy="285120"/>
+            <a:ext cx="784800" cy="284760"/>
           </a:xfrm>
           <a:prstGeom prst="rect">
             <a:avLst/>
@@ -7666,14 +7671,14 @@
       </p:sp>
       <p:sp>
         <p:nvSpPr>
-          <p:cNvPr id="133" name="CustomShape 3"/>
+          <p:cNvPr id="132" name="CustomShape 3"/>
           <p:cNvSpPr/>
           <p:nvPr/>
         </p:nvSpPr>
         <p:spPr>
           <a:xfrm>
             <a:off x="428760" y="642960"/>
-            <a:ext cx="8257320" cy="785160"/>
+            <a:ext cx="8256960" cy="784800"/>
           </a:xfrm>
           <a:prstGeom prst="rect">
             <a:avLst/>
@@ -7692,7 +7697,7 @@
         <p:txBody>
           <a:bodyPr lIns="90000" rIns="90000" tIns="45000" bIns="45000" anchor="ctr"/>
           <a:p>
-            <a:pPr marL="571680" indent="-570960">
+            <a:pPr marL="571680" indent="-570600">
               <a:lnSpc>
                 <a:spcPct val="100000"/>
               </a:lnSpc>
@@ -7708,6 +7713,7 @@
                   </a:solidFill>
                 </a:uFill>
                 <a:latin typeface="Calibri"/>
+                <a:ea typeface="DejaVu Sans"/>
               </a:rPr>
               <a:t>III.   Third lesson</a:t>
             </a:r>
@@ -7766,14 +7772,14 @@
       </p:grpSpPr>
       <p:sp>
         <p:nvSpPr>
-          <p:cNvPr id="77" name="CustomShape 1"/>
+          <p:cNvPr id="76" name="CustomShape 1"/>
           <p:cNvSpPr/>
           <p:nvPr/>
         </p:nvSpPr>
         <p:spPr>
           <a:xfrm>
             <a:off x="457200" y="274680"/>
-            <a:ext cx="8228880" cy="1142280"/>
+            <a:ext cx="8228520" cy="1141920"/>
           </a:xfrm>
           <a:prstGeom prst="rect">
             <a:avLst/>
@@ -7808,6 +7814,7 @@
                   </a:solidFill>
                 </a:uFill>
                 <a:latin typeface="Arial"/>
+                <a:ea typeface="DejaVu Sans"/>
               </a:rPr>
               <a:t>Introduction</a:t>
             </a:r>
@@ -7817,14 +7824,14 @@
       </p:sp>
       <p:sp>
         <p:nvSpPr>
-          <p:cNvPr id="78" name="CustomShape 2"/>
+          <p:cNvPr id="77" name="CustomShape 2"/>
           <p:cNvSpPr/>
           <p:nvPr/>
         </p:nvSpPr>
         <p:spPr>
           <a:xfrm>
             <a:off x="457200" y="1600200"/>
-            <a:ext cx="8228880" cy="4525200"/>
+            <a:ext cx="8228520" cy="4524840"/>
           </a:xfrm>
           <a:prstGeom prst="rect">
             <a:avLst/>
@@ -7843,47 +7850,47 @@
         <p:txBody>
           <a:bodyPr lIns="90000" rIns="90000" tIns="45000" bIns="45000"/>
           <a:p>
-            <a:pPr marL="343080" indent="-342360">
-              <a:lnSpc>
-                <a:spcPct val="100000"/>
-              </a:lnSpc>
-            </a:pPr>
-            <a:endParaRPr/>
-          </a:p>
-          <a:p>
-            <a:pPr marL="343080" indent="-342360">
-              <a:lnSpc>
-                <a:spcPct val="100000"/>
-              </a:lnSpc>
-            </a:pPr>
-            <a:endParaRPr/>
-          </a:p>
-          <a:p>
-            <a:pPr marL="343080" indent="-342360">
-              <a:lnSpc>
-                <a:spcPct val="100000"/>
-              </a:lnSpc>
-            </a:pPr>
-            <a:endParaRPr/>
-          </a:p>
-          <a:p>
-            <a:pPr marL="343080" indent="-342360">
-              <a:lnSpc>
-                <a:spcPct val="100000"/>
-              </a:lnSpc>
-            </a:pPr>
-            <a:endParaRPr/>
-          </a:p>
-          <a:p>
-            <a:pPr marL="343080" indent="-342360" algn="ctr">
-              <a:lnSpc>
-                <a:spcPct val="100000"/>
-              </a:lnSpc>
-            </a:pPr>
-            <a:endParaRPr/>
-          </a:p>
-          <a:p>
-            <a:pPr marL="343080" indent="-342360" algn="ctr">
+            <a:pPr marL="343080" indent="-342000">
+              <a:lnSpc>
+                <a:spcPct val="100000"/>
+              </a:lnSpc>
+            </a:pPr>
+            <a:endParaRPr/>
+          </a:p>
+          <a:p>
+            <a:pPr marL="343080" indent="-342000">
+              <a:lnSpc>
+                <a:spcPct val="100000"/>
+              </a:lnSpc>
+            </a:pPr>
+            <a:endParaRPr/>
+          </a:p>
+          <a:p>
+            <a:pPr marL="343080" indent="-342000">
+              <a:lnSpc>
+                <a:spcPct val="100000"/>
+              </a:lnSpc>
+            </a:pPr>
+            <a:endParaRPr/>
+          </a:p>
+          <a:p>
+            <a:pPr marL="343080" indent="-342000">
+              <a:lnSpc>
+                <a:spcPct val="100000"/>
+              </a:lnSpc>
+            </a:pPr>
+            <a:endParaRPr/>
+          </a:p>
+          <a:p>
+            <a:pPr marL="343080" indent="-342000" algn="ctr">
+              <a:lnSpc>
+                <a:spcPct val="100000"/>
+              </a:lnSpc>
+            </a:pPr>
+            <a:endParaRPr/>
+          </a:p>
+          <a:p>
+            <a:pPr marL="343080" indent="-342000" algn="ctr">
               <a:lnSpc>
                 <a:spcPct val="100000"/>
               </a:lnSpc>
@@ -7899,21 +7906,22 @@
                   </a:solidFill>
                 </a:uFill>
                 <a:latin typeface="Calibri"/>
+                <a:ea typeface="DejaVu Sans"/>
               </a:rPr>
               <a:t>In this following presentation, we are going to show you the procedure we attend to answer to your different questions during the course “ Génie logiciel avancée “.</a:t>
             </a:r>
             <a:endParaRPr/>
           </a:p>
           <a:p>
-            <a:pPr marL="343080" indent="-342360" algn="ctr">
-              <a:lnSpc>
-                <a:spcPct val="100000"/>
-              </a:lnSpc>
-            </a:pPr>
-            <a:endParaRPr/>
-          </a:p>
-          <a:p>
-            <a:pPr marL="343080" indent="-342360" algn="ctr">
+            <a:pPr marL="343080" indent="-342000" algn="ctr">
+              <a:lnSpc>
+                <a:spcPct val="100000"/>
+              </a:lnSpc>
+            </a:pPr>
+            <a:endParaRPr/>
+          </a:p>
+          <a:p>
+            <a:pPr marL="343080" indent="-342000" algn="ctr">
               <a:lnSpc>
                 <a:spcPct val="100000"/>
               </a:lnSpc>
@@ -7929,21 +7937,22 @@
                   </a:solidFill>
                 </a:uFill>
                 <a:latin typeface="Calibri"/>
+                <a:ea typeface="DejaVu Sans"/>
               </a:rPr>
               <a:t>This presentation shows the different steps that we followed to realize the project named “ Flight Planning System “ from the beginning to the end.</a:t>
             </a:r>
             <a:endParaRPr/>
           </a:p>
           <a:p>
-            <a:pPr marL="343080" indent="-342360" algn="ctr">
-              <a:lnSpc>
-                <a:spcPct val="100000"/>
-              </a:lnSpc>
-            </a:pPr>
-            <a:endParaRPr/>
-          </a:p>
-          <a:p>
-            <a:pPr marL="343080" indent="-342360" algn="ctr">
+            <a:pPr marL="343080" indent="-342000" algn="ctr">
+              <a:lnSpc>
+                <a:spcPct val="100000"/>
+              </a:lnSpc>
+            </a:pPr>
+            <a:endParaRPr/>
+          </a:p>
+          <a:p>
+            <a:pPr marL="343080" indent="-342000" algn="ctr">
               <a:lnSpc>
                 <a:spcPct val="100000"/>
               </a:lnSpc>
@@ -7959,13 +7968,14 @@
                   </a:solidFill>
                 </a:uFill>
                 <a:latin typeface="Calibri"/>
+                <a:ea typeface="DejaVu Sans"/>
               </a:rPr>
               <a:t>It will be also the support for our last presentation with you.</a:t>
             </a:r>
             <a:endParaRPr/>
           </a:p>
           <a:p>
-            <a:pPr marL="343080" indent="-342360">
+            <a:pPr marL="343080" indent="-342000">
               <a:lnSpc>
                 <a:spcPct val="100000"/>
               </a:lnSpc>
@@ -7976,14 +7986,14 @@
       </p:sp>
       <p:sp>
         <p:nvSpPr>
-          <p:cNvPr id="79" name="CustomShape 3"/>
+          <p:cNvPr id="78" name="CustomShape 3"/>
           <p:cNvSpPr/>
           <p:nvPr/>
         </p:nvSpPr>
         <p:spPr>
           <a:xfrm>
             <a:off x="0" y="6572160"/>
-            <a:ext cx="785160" cy="285120"/>
+            <a:ext cx="784800" cy="284760"/>
           </a:xfrm>
           <a:prstGeom prst="rect">
             <a:avLst/>
@@ -8064,14 +8074,14 @@
       </p:grpSpPr>
       <p:sp>
         <p:nvSpPr>
-          <p:cNvPr id="80" name="CustomShape 1"/>
+          <p:cNvPr id="79" name="CustomShape 1"/>
           <p:cNvSpPr/>
           <p:nvPr/>
         </p:nvSpPr>
         <p:spPr>
           <a:xfrm>
             <a:off x="457200" y="274680"/>
-            <a:ext cx="8228880" cy="1142280"/>
+            <a:ext cx="8228520" cy="1141920"/>
           </a:xfrm>
           <a:prstGeom prst="rect">
             <a:avLst/>
@@ -8106,6 +8116,7 @@
                   </a:solidFill>
                 </a:uFill>
                 <a:latin typeface="Arial"/>
+                <a:ea typeface="DejaVu Sans"/>
               </a:rPr>
               <a:t>Plan</a:t>
             </a:r>
@@ -8115,14 +8126,14 @@
       </p:sp>
       <p:sp>
         <p:nvSpPr>
-          <p:cNvPr id="81" name="CustomShape 2"/>
+          <p:cNvPr id="80" name="CustomShape 2"/>
           <p:cNvSpPr/>
           <p:nvPr/>
         </p:nvSpPr>
         <p:spPr>
           <a:xfrm>
             <a:off x="457200" y="1600200"/>
-            <a:ext cx="8228880" cy="4525200"/>
+            <a:ext cx="8228520" cy="4524840"/>
           </a:xfrm>
           <a:prstGeom prst="rect">
             <a:avLst/>
@@ -8149,7 +8160,7 @@
             <a:endParaRPr/>
           </a:p>
           <a:p>
-            <a:pPr marL="343080" indent="-342360">
+            <a:pPr marL="343080" indent="-342000">
               <a:lnSpc>
                 <a:spcPct val="100000"/>
               </a:lnSpc>
@@ -8167,13 +8178,14 @@
                   </a:solidFill>
                 </a:uFill>
                 <a:latin typeface="Arial"/>
+                <a:ea typeface="DejaVu Sans"/>
               </a:rPr>
               <a:t>I- First lesson</a:t>
             </a:r>
             <a:endParaRPr/>
           </a:p>
           <a:p>
-            <a:pPr marL="343080" indent="-342360">
+            <a:pPr marL="343080" indent="-342000">
               <a:lnSpc>
                 <a:spcPct val="100000"/>
               </a:lnSpc>
@@ -8191,13 +8203,14 @@
                   </a:solidFill>
                 </a:uFill>
                 <a:latin typeface="Arial"/>
+                <a:ea typeface="DejaVu Sans"/>
               </a:rPr>
               <a:t>II- Second lesson</a:t>
             </a:r>
             <a:endParaRPr/>
           </a:p>
           <a:p>
-            <a:pPr marL="343080" indent="-342360">
+            <a:pPr marL="343080" indent="-342000">
               <a:lnSpc>
                 <a:spcPct val="100000"/>
               </a:lnSpc>
@@ -8215,6 +8228,7 @@
                   </a:solidFill>
                 </a:uFill>
                 <a:latin typeface="Arial"/>
+                <a:ea typeface="DejaVu Sans"/>
               </a:rPr>
               <a:t>III- Third lessen</a:t>
             </a:r>
@@ -8232,14 +8246,14 @@
       </p:sp>
       <p:sp>
         <p:nvSpPr>
-          <p:cNvPr id="82" name="CustomShape 3"/>
+          <p:cNvPr id="81" name="CustomShape 3"/>
           <p:cNvSpPr/>
           <p:nvPr/>
         </p:nvSpPr>
         <p:spPr>
           <a:xfrm>
             <a:off x="0" y="6572160"/>
-            <a:ext cx="785160" cy="285120"/>
+            <a:ext cx="784800" cy="284760"/>
           </a:xfrm>
           <a:prstGeom prst="rect">
             <a:avLst/>
@@ -8320,14 +8334,14 @@
       </p:grpSpPr>
       <p:sp>
         <p:nvSpPr>
-          <p:cNvPr id="83" name="CustomShape 1"/>
+          <p:cNvPr id="82" name="CustomShape 1"/>
           <p:cNvSpPr/>
           <p:nvPr/>
         </p:nvSpPr>
         <p:spPr>
           <a:xfrm>
             <a:off x="428760" y="642960"/>
-            <a:ext cx="8257320" cy="785160"/>
+            <a:ext cx="8256960" cy="784800"/>
           </a:xfrm>
           <a:prstGeom prst="rect">
             <a:avLst/>
@@ -8346,7 +8360,7 @@
         <p:txBody>
           <a:bodyPr lIns="90000" rIns="90000" tIns="45000" bIns="45000" anchor="ctr"/>
           <a:p>
-            <a:pPr marL="571680" indent="-570960">
+            <a:pPr marL="571680" indent="-570600">
               <a:lnSpc>
                 <a:spcPct val="100000"/>
               </a:lnSpc>
@@ -8364,6 +8378,7 @@
                   </a:solidFill>
                 </a:uFill>
                 <a:latin typeface="Calibri"/>
+                <a:ea typeface="DejaVu Sans"/>
               </a:rPr>
               <a:t>First lesson</a:t>
             </a:r>
@@ -8373,14 +8388,14 @@
       </p:sp>
       <p:sp>
         <p:nvSpPr>
-          <p:cNvPr id="84" name="CustomShape 2"/>
+          <p:cNvPr id="83" name="CustomShape 2"/>
           <p:cNvSpPr/>
           <p:nvPr/>
         </p:nvSpPr>
         <p:spPr>
           <a:xfrm>
             <a:off x="428760" y="1500120"/>
-            <a:ext cx="8228880" cy="4525200"/>
+            <a:ext cx="8228520" cy="4524840"/>
           </a:xfrm>
           <a:prstGeom prst="rect">
             <a:avLst/>
@@ -8399,15 +8414,15 @@
         <p:txBody>
           <a:bodyPr lIns="90000" rIns="90000" tIns="45000" bIns="45000"/>
           <a:p>
-            <a:pPr marL="343080" indent="-342360">
-              <a:lnSpc>
-                <a:spcPct val="100000"/>
-              </a:lnSpc>
-            </a:pPr>
-            <a:endParaRPr/>
-          </a:p>
-          <a:p>
-            <a:pPr marL="343080" indent="-342360">
+            <a:pPr marL="343080" indent="-342000">
+              <a:lnSpc>
+                <a:spcPct val="100000"/>
+              </a:lnSpc>
+            </a:pPr>
+            <a:endParaRPr/>
+          </a:p>
+          <a:p>
+            <a:pPr marL="343080" indent="-342000">
               <a:lnSpc>
                 <a:spcPct val="100000"/>
               </a:lnSpc>
@@ -8445,15 +8460,15 @@
             <a:endParaRPr/>
           </a:p>
           <a:p>
-            <a:pPr marL="343080" indent="-342360">
-              <a:lnSpc>
-                <a:spcPct val="100000"/>
-              </a:lnSpc>
-            </a:pPr>
-            <a:endParaRPr/>
-          </a:p>
-          <a:p>
-            <a:pPr marL="343080" indent="-342360">
+            <a:pPr marL="343080" indent="-342000">
+              <a:lnSpc>
+                <a:spcPct val="100000"/>
+              </a:lnSpc>
+            </a:pPr>
+            <a:endParaRPr/>
+          </a:p>
+          <a:p>
+            <a:pPr marL="343080" indent="-342000">
               <a:lnSpc>
                 <a:spcPct val="100000"/>
               </a:lnSpc>
@@ -8476,15 +8491,15 @@
             <a:endParaRPr/>
           </a:p>
           <a:p>
-            <a:pPr marL="457200" indent="-316800">
-              <a:lnSpc>
-                <a:spcPct val="100000"/>
-              </a:lnSpc>
-            </a:pPr>
-            <a:endParaRPr/>
-          </a:p>
-          <a:p>
-            <a:pPr marL="482760" indent="-342360">
+            <a:pPr marL="457200" indent="-316440">
+              <a:lnSpc>
+                <a:spcPct val="100000"/>
+              </a:lnSpc>
+            </a:pPr>
+            <a:endParaRPr/>
+          </a:p>
+          <a:p>
+            <a:pPr marL="482760" indent="-342000">
               <a:lnSpc>
                 <a:spcPct val="100000"/>
               </a:lnSpc>
@@ -8522,7 +8537,7 @@
             <a:endParaRPr/>
           </a:p>
           <a:p>
-            <a:pPr marL="457200" indent="-316800">
+            <a:pPr marL="457200" indent="-316440">
               <a:lnSpc>
                 <a:spcPct val="100000"/>
               </a:lnSpc>
@@ -8560,7 +8575,7 @@
             <a:endParaRPr/>
           </a:p>
           <a:p>
-            <a:pPr marL="457200" indent="-316800">
+            <a:pPr marL="457200" indent="-316440">
               <a:lnSpc>
                 <a:spcPct val="100000"/>
               </a:lnSpc>
@@ -8598,15 +8613,15 @@
             <a:endParaRPr/>
           </a:p>
           <a:p>
-            <a:pPr marL="457200" indent="-316800">
-              <a:lnSpc>
-                <a:spcPct val="100000"/>
-              </a:lnSpc>
-            </a:pPr>
-            <a:endParaRPr/>
-          </a:p>
-          <a:p>
-            <a:pPr marL="343080" indent="-342360">
+            <a:pPr marL="457200" indent="-316440">
+              <a:lnSpc>
+                <a:spcPct val="100000"/>
+              </a:lnSpc>
+            </a:pPr>
+            <a:endParaRPr/>
+          </a:p>
+          <a:p>
+            <a:pPr marL="343080" indent="-342000">
               <a:lnSpc>
                 <a:spcPct val="100000"/>
               </a:lnSpc>
@@ -8659,15 +8674,15 @@
             <a:endParaRPr/>
           </a:p>
           <a:p>
-            <a:pPr marL="343080" indent="-342360">
-              <a:lnSpc>
-                <a:spcPct val="100000"/>
-              </a:lnSpc>
-            </a:pPr>
-            <a:endParaRPr/>
-          </a:p>
-          <a:p>
-            <a:pPr marL="457200" indent="-316800">
+            <a:pPr marL="343080" indent="-342000">
+              <a:lnSpc>
+                <a:spcPct val="100000"/>
+              </a:lnSpc>
+            </a:pPr>
+            <a:endParaRPr/>
+          </a:p>
+          <a:p>
+            <a:pPr marL="457200" indent="-316440">
               <a:lnSpc>
                 <a:spcPct val="107000"/>
               </a:lnSpc>
@@ -8690,7 +8705,7 @@
             <a:endParaRPr/>
           </a:p>
           <a:p>
-            <a:pPr marL="457200" indent="-316800">
+            <a:pPr marL="457200" indent="-316440">
               <a:lnSpc>
                 <a:spcPct val="107000"/>
               </a:lnSpc>
@@ -8698,7 +8713,7 @@
             <a:endParaRPr/>
           </a:p>
           <a:p>
-            <a:pPr marL="457200" indent="-316800">
+            <a:pPr marL="457200" indent="-316440">
               <a:lnSpc>
                 <a:spcPct val="107000"/>
               </a:lnSpc>
@@ -8736,7 +8751,7 @@
             <a:endParaRPr/>
           </a:p>
           <a:p>
-            <a:pPr marL="457200" indent="-316800">
+            <a:pPr marL="457200" indent="-316440">
               <a:lnSpc>
                 <a:spcPct val="107000"/>
               </a:lnSpc>
@@ -8774,7 +8789,7 @@
             <a:endParaRPr/>
           </a:p>
           <a:p>
-            <a:pPr marL="343080" indent="-342360">
+            <a:pPr marL="343080" indent="-342000">
               <a:lnSpc>
                 <a:spcPct val="107000"/>
               </a:lnSpc>
@@ -8782,7 +8797,7 @@
             <a:endParaRPr/>
           </a:p>
           <a:p>
-            <a:pPr marL="457200" indent="-316800">
+            <a:pPr marL="457200" indent="-316440">
               <a:lnSpc>
                 <a:spcPct val="107000"/>
               </a:lnSpc>
@@ -8805,15 +8820,15 @@
             <a:endParaRPr/>
           </a:p>
           <a:p>
-            <a:pPr marL="343080" indent="-342360">
-              <a:lnSpc>
-                <a:spcPct val="100000"/>
-              </a:lnSpc>
-            </a:pPr>
-            <a:endParaRPr/>
-          </a:p>
-          <a:p>
-            <a:pPr marL="343080" indent="-342360">
+            <a:pPr marL="343080" indent="-342000">
+              <a:lnSpc>
+                <a:spcPct val="100000"/>
+              </a:lnSpc>
+            </a:pPr>
+            <a:endParaRPr/>
+          </a:p>
+          <a:p>
+            <a:pPr marL="343080" indent="-342000">
               <a:lnSpc>
                 <a:spcPct val="100000"/>
               </a:lnSpc>
@@ -8824,14 +8839,14 @@
       </p:sp>
       <p:sp>
         <p:nvSpPr>
-          <p:cNvPr id="85" name="CustomShape 3"/>
+          <p:cNvPr id="84" name="CustomShape 3"/>
           <p:cNvSpPr/>
           <p:nvPr/>
         </p:nvSpPr>
         <p:spPr>
           <a:xfrm>
             <a:off x="0" y="6572160"/>
-            <a:ext cx="785160" cy="285120"/>
+            <a:ext cx="784800" cy="284760"/>
           </a:xfrm>
           <a:prstGeom prst="rect">
             <a:avLst/>
@@ -8912,14 +8927,14 @@
       </p:grpSpPr>
       <p:sp>
         <p:nvSpPr>
-          <p:cNvPr id="86" name="CustomShape 1"/>
+          <p:cNvPr id="85" name="CustomShape 1"/>
           <p:cNvSpPr/>
           <p:nvPr/>
         </p:nvSpPr>
         <p:spPr>
           <a:xfrm>
             <a:off x="428760" y="1714320"/>
-            <a:ext cx="8228880" cy="4928400"/>
+            <a:ext cx="8228520" cy="4928040"/>
           </a:xfrm>
           <a:prstGeom prst="rect">
             <a:avLst/>
@@ -8938,7 +8953,7 @@
         <p:txBody>
           <a:bodyPr lIns="90000" rIns="90000" tIns="45000" bIns="45000"/>
           <a:p>
-            <a:pPr marL="343080" indent="-342360">
+            <a:pPr marL="343080" indent="-342000">
               <a:lnSpc>
                 <a:spcPct val="100000"/>
               </a:lnSpc>
@@ -8954,6 +8969,7 @@
                   </a:solidFill>
                 </a:uFill>
                 <a:latin typeface="Calibri"/>
+                <a:ea typeface="DejaVu Sans"/>
               </a:rPr>
               <a:t>Users of the system</a:t>
             </a:r>
@@ -8968,21 +8984,22 @@
                   </a:solidFill>
                 </a:uFill>
                 <a:latin typeface="Calibri"/>
+                <a:ea typeface="DejaVu Sans"/>
               </a:rPr>
               <a:t> :</a:t>
             </a:r>
             <a:endParaRPr/>
           </a:p>
           <a:p>
-            <a:pPr marL="343080" indent="-342360">
-              <a:lnSpc>
-                <a:spcPct val="100000"/>
-              </a:lnSpc>
-            </a:pPr>
-            <a:endParaRPr/>
-          </a:p>
-          <a:p>
-            <a:pPr marL="343080" indent="-342360">
+            <a:pPr marL="343080" indent="-342000">
+              <a:lnSpc>
+                <a:spcPct val="100000"/>
+              </a:lnSpc>
+            </a:pPr>
+            <a:endParaRPr/>
+          </a:p>
+          <a:p>
+            <a:pPr marL="343080" indent="-342000">
               <a:lnSpc>
                 <a:spcPct val="100000"/>
               </a:lnSpc>
@@ -9005,15 +9022,15 @@
             <a:endParaRPr/>
           </a:p>
           <a:p>
-            <a:pPr marL="343080" indent="-342360">
-              <a:lnSpc>
-                <a:spcPct val="100000"/>
-              </a:lnSpc>
-            </a:pPr>
-            <a:endParaRPr/>
-          </a:p>
-          <a:p>
-            <a:pPr marL="457200" indent="-304200">
+            <a:pPr marL="343080" indent="-342000">
+              <a:lnSpc>
+                <a:spcPct val="100000"/>
+              </a:lnSpc>
+            </a:pPr>
+            <a:endParaRPr/>
+          </a:p>
+          <a:p>
+            <a:pPr marL="457200" indent="-303840">
               <a:lnSpc>
                 <a:spcPct val="100000"/>
               </a:lnSpc>
@@ -9051,15 +9068,15 @@
             <a:endParaRPr/>
           </a:p>
           <a:p>
-            <a:pPr marL="457200" indent="-304200">
-              <a:lnSpc>
-                <a:spcPct val="100000"/>
-              </a:lnSpc>
-            </a:pPr>
-            <a:endParaRPr/>
-          </a:p>
-          <a:p>
-            <a:pPr marL="457200" indent="-304200">
+            <a:pPr marL="457200" indent="-303840">
+              <a:lnSpc>
+                <a:spcPct val="100000"/>
+              </a:lnSpc>
+            </a:pPr>
+            <a:endParaRPr/>
+          </a:p>
+          <a:p>
+            <a:pPr marL="457200" indent="-303840">
               <a:lnSpc>
                 <a:spcPct val="100000"/>
               </a:lnSpc>
@@ -9118,7 +9135,7 @@
             <a:endParaRPr/>
           </a:p>
           <a:p>
-            <a:pPr marL="457200" indent="-304200">
+            <a:pPr marL="457200" indent="-303840">
               <a:lnSpc>
                 <a:spcPct val="100000"/>
               </a:lnSpc>
@@ -9186,7 +9203,7 @@
             <a:endParaRPr/>
           </a:p>
           <a:p>
-            <a:pPr marL="457200" indent="-304200">
+            <a:pPr marL="457200" indent="-303840">
               <a:lnSpc>
                 <a:spcPct val="100000"/>
               </a:lnSpc>
@@ -9224,15 +9241,15 @@
             <a:endParaRPr/>
           </a:p>
           <a:p>
-            <a:pPr marL="457200" indent="-304200">
-              <a:lnSpc>
-                <a:spcPct val="100000"/>
-              </a:lnSpc>
-            </a:pPr>
-            <a:endParaRPr/>
-          </a:p>
-          <a:p>
-            <a:pPr marL="457200" indent="-304200">
+            <a:pPr marL="457200" indent="-303840">
+              <a:lnSpc>
+                <a:spcPct val="100000"/>
+              </a:lnSpc>
+            </a:pPr>
+            <a:endParaRPr/>
+          </a:p>
+          <a:p>
+            <a:pPr marL="457200" indent="-303840">
               <a:lnSpc>
                 <a:spcPct val="100000"/>
               </a:lnSpc>
@@ -9285,7 +9302,7 @@
             <a:endParaRPr/>
           </a:p>
           <a:p>
-            <a:pPr marL="457200" indent="-304200">
+            <a:pPr marL="457200" indent="-303840">
               <a:lnSpc>
                 <a:spcPct val="100000"/>
               </a:lnSpc>
@@ -9323,15 +9340,15 @@
             <a:endParaRPr/>
           </a:p>
           <a:p>
-            <a:pPr marL="457200" indent="-304200">
-              <a:lnSpc>
-                <a:spcPct val="100000"/>
-              </a:lnSpc>
-            </a:pPr>
-            <a:endParaRPr/>
-          </a:p>
-          <a:p>
-            <a:pPr marL="457200" indent="-304200">
+            <a:pPr marL="457200" indent="-303840">
+              <a:lnSpc>
+                <a:spcPct val="100000"/>
+              </a:lnSpc>
+            </a:pPr>
+            <a:endParaRPr/>
+          </a:p>
+          <a:p>
+            <a:pPr marL="457200" indent="-303840">
               <a:lnSpc>
                 <a:spcPct val="100000"/>
               </a:lnSpc>
@@ -9369,7 +9386,7 @@
             <a:endParaRPr/>
           </a:p>
           <a:p>
-            <a:pPr marL="457200" indent="-304200">
+            <a:pPr marL="457200" indent="-303840">
               <a:lnSpc>
                 <a:spcPct val="100000"/>
               </a:lnSpc>
@@ -9392,15 +9409,15 @@
             <a:endParaRPr/>
           </a:p>
           <a:p>
-            <a:pPr marL="457200" indent="-304200">
-              <a:lnSpc>
-                <a:spcPct val="100000"/>
-              </a:lnSpc>
-            </a:pPr>
-            <a:endParaRPr/>
-          </a:p>
-          <a:p>
-            <a:pPr marL="457200" indent="-304200">
+            <a:pPr marL="457200" indent="-303840">
+              <a:lnSpc>
+                <a:spcPct val="100000"/>
+              </a:lnSpc>
+            </a:pPr>
+            <a:endParaRPr/>
+          </a:p>
+          <a:p>
+            <a:pPr marL="457200" indent="-303840">
               <a:lnSpc>
                 <a:spcPct val="100000"/>
               </a:lnSpc>
@@ -9411,14 +9428,14 @@
       </p:sp>
       <p:sp>
         <p:nvSpPr>
-          <p:cNvPr id="87" name="CustomShape 2"/>
+          <p:cNvPr id="86" name="CustomShape 2"/>
           <p:cNvSpPr/>
           <p:nvPr/>
         </p:nvSpPr>
         <p:spPr>
           <a:xfrm>
             <a:off x="0" y="6572160"/>
-            <a:ext cx="785160" cy="285120"/>
+            <a:ext cx="784800" cy="284760"/>
           </a:xfrm>
           <a:prstGeom prst="rect">
             <a:avLst/>
@@ -9450,14 +9467,14 @@
       </p:sp>
       <p:sp>
         <p:nvSpPr>
-          <p:cNvPr id="88" name="CustomShape 3"/>
+          <p:cNvPr id="87" name="CustomShape 3"/>
           <p:cNvSpPr/>
           <p:nvPr/>
         </p:nvSpPr>
         <p:spPr>
           <a:xfrm>
             <a:off x="428760" y="642960"/>
-            <a:ext cx="8257320" cy="785160"/>
+            <a:ext cx="8256960" cy="784800"/>
           </a:xfrm>
           <a:prstGeom prst="rect">
             <a:avLst/>
@@ -9476,7 +9493,7 @@
         <p:txBody>
           <a:bodyPr lIns="90000" rIns="90000" tIns="45000" bIns="45000" anchor="ctr"/>
           <a:p>
-            <a:pPr marL="571680" indent="-570960">
+            <a:pPr marL="571680" indent="-570600">
               <a:lnSpc>
                 <a:spcPct val="100000"/>
               </a:lnSpc>
@@ -9494,6 +9511,7 @@
                   </a:solidFill>
                 </a:uFill>
                 <a:latin typeface="Calibri"/>
+                <a:ea typeface="DejaVu Sans"/>
               </a:rPr>
               <a:t>First lesson</a:t>
             </a:r>
@@ -9552,14 +9570,14 @@
       </p:grpSpPr>
       <p:sp>
         <p:nvSpPr>
-          <p:cNvPr id="89" name="CustomShape 1"/>
+          <p:cNvPr id="88" name="CustomShape 1"/>
           <p:cNvSpPr/>
           <p:nvPr/>
         </p:nvSpPr>
         <p:spPr>
           <a:xfrm>
             <a:off x="428760" y="1714320"/>
-            <a:ext cx="8228880" cy="4928400"/>
+            <a:ext cx="8228520" cy="4928040"/>
           </a:xfrm>
           <a:prstGeom prst="rect">
             <a:avLst/>
@@ -9578,7 +9596,7 @@
         <p:txBody>
           <a:bodyPr lIns="90000" rIns="90000" tIns="45000" bIns="45000"/>
           <a:p>
-            <a:pPr marL="343080" indent="-342360">
+            <a:pPr marL="343080" indent="-342000">
               <a:lnSpc>
                 <a:spcPct val="100000"/>
               </a:lnSpc>
@@ -9594,6 +9612,7 @@
                   </a:solidFill>
                 </a:uFill>
                 <a:latin typeface="Calibri"/>
+                <a:ea typeface="DejaVu Sans"/>
               </a:rPr>
               <a:t>Users of the system</a:t>
             </a:r>
@@ -9608,21 +9627,22 @@
                   </a:solidFill>
                 </a:uFill>
                 <a:latin typeface="Calibri"/>
+                <a:ea typeface="DejaVu Sans"/>
               </a:rPr>
               <a:t> :</a:t>
             </a:r>
             <a:endParaRPr/>
           </a:p>
           <a:p>
-            <a:pPr marL="343080" indent="-342360">
-              <a:lnSpc>
-                <a:spcPct val="100000"/>
-              </a:lnSpc>
-            </a:pPr>
-            <a:endParaRPr/>
-          </a:p>
-          <a:p>
-            <a:pPr marL="457200" indent="-304200">
+            <a:pPr marL="343080" indent="-342000">
+              <a:lnSpc>
+                <a:spcPct val="100000"/>
+              </a:lnSpc>
+            </a:pPr>
+            <a:endParaRPr/>
+          </a:p>
+          <a:p>
+            <a:pPr marL="457200" indent="-303840">
               <a:lnSpc>
                 <a:spcPct val="100000"/>
               </a:lnSpc>
@@ -9660,7 +9680,7 @@
             <a:endParaRPr/>
           </a:p>
           <a:p>
-            <a:pPr marL="457200" indent="-304200">
+            <a:pPr marL="457200" indent="-303840">
               <a:lnSpc>
                 <a:spcPct val="100000"/>
               </a:lnSpc>
@@ -9713,15 +9733,15 @@
             <a:endParaRPr/>
           </a:p>
           <a:p>
-            <a:pPr marL="457200" indent="-304200">
-              <a:lnSpc>
-                <a:spcPct val="100000"/>
-              </a:lnSpc>
-            </a:pPr>
-            <a:endParaRPr/>
-          </a:p>
-          <a:p>
-            <a:pPr marL="457200" indent="-304200">
+            <a:pPr marL="457200" indent="-303840">
+              <a:lnSpc>
+                <a:spcPct val="100000"/>
+              </a:lnSpc>
+            </a:pPr>
+            <a:endParaRPr/>
+          </a:p>
+          <a:p>
+            <a:pPr marL="457200" indent="-303840">
               <a:lnSpc>
                 <a:spcPct val="100000"/>
               </a:lnSpc>
@@ -9759,7 +9779,7 @@
             <a:endParaRPr/>
           </a:p>
           <a:p>
-            <a:pPr marL="457200" indent="-304200">
+            <a:pPr marL="457200" indent="-303840">
               <a:lnSpc>
                 <a:spcPct val="100000"/>
               </a:lnSpc>
@@ -9797,15 +9817,15 @@
             <a:endParaRPr/>
           </a:p>
           <a:p>
-            <a:pPr marL="457200" indent="-304200">
-              <a:lnSpc>
-                <a:spcPct val="100000"/>
-              </a:lnSpc>
-            </a:pPr>
-            <a:endParaRPr/>
-          </a:p>
-          <a:p>
-            <a:pPr marL="457200" indent="-304200">
+            <a:pPr marL="457200" indent="-303840">
+              <a:lnSpc>
+                <a:spcPct val="100000"/>
+              </a:lnSpc>
+            </a:pPr>
+            <a:endParaRPr/>
+          </a:p>
+          <a:p>
+            <a:pPr marL="457200" indent="-303840">
               <a:lnSpc>
                 <a:spcPct val="100000"/>
               </a:lnSpc>
@@ -9843,7 +9863,7 @@
             <a:endParaRPr/>
           </a:p>
           <a:p>
-            <a:pPr marL="457200" indent="-304200">
+            <a:pPr marL="457200" indent="-303840">
               <a:lnSpc>
                 <a:spcPct val="100000"/>
               </a:lnSpc>
@@ -9896,15 +9916,15 @@
             <a:endParaRPr/>
           </a:p>
           <a:p>
-            <a:pPr marL="343080" indent="-342360">
-              <a:lnSpc>
-                <a:spcPct val="100000"/>
-              </a:lnSpc>
-            </a:pPr>
-            <a:endParaRPr/>
-          </a:p>
-          <a:p>
-            <a:pPr marL="343080" indent="-342360">
+            <a:pPr marL="343080" indent="-342000">
+              <a:lnSpc>
+                <a:spcPct val="100000"/>
+              </a:lnSpc>
+            </a:pPr>
+            <a:endParaRPr/>
+          </a:p>
+          <a:p>
+            <a:pPr marL="343080" indent="-342000">
               <a:lnSpc>
                 <a:spcPct val="100000"/>
               </a:lnSpc>
@@ -9927,15 +9947,15 @@
             <a:endParaRPr/>
           </a:p>
           <a:p>
-            <a:pPr marL="343080" indent="-342360">
-              <a:lnSpc>
-                <a:spcPct val="100000"/>
-              </a:lnSpc>
-            </a:pPr>
-            <a:endParaRPr/>
-          </a:p>
-          <a:p>
-            <a:pPr marL="457200" indent="-304200">
+            <a:pPr marL="343080" indent="-342000">
+              <a:lnSpc>
+                <a:spcPct val="100000"/>
+              </a:lnSpc>
+            </a:pPr>
+            <a:endParaRPr/>
+          </a:p>
+          <a:p>
+            <a:pPr marL="457200" indent="-303840">
               <a:lnSpc>
                 <a:spcPct val="100000"/>
               </a:lnSpc>
@@ -9973,7 +9993,7 @@
             <a:endParaRPr/>
           </a:p>
           <a:p>
-            <a:pPr marL="457200" indent="-304200">
+            <a:pPr marL="457200" indent="-303840">
               <a:lnSpc>
                 <a:spcPct val="100000"/>
               </a:lnSpc>
@@ -10026,15 +10046,15 @@
             <a:endParaRPr/>
           </a:p>
           <a:p>
-            <a:pPr marL="457200" indent="-304200">
-              <a:lnSpc>
-                <a:spcPct val="100000"/>
-              </a:lnSpc>
-            </a:pPr>
-            <a:endParaRPr/>
-          </a:p>
-          <a:p>
-            <a:pPr marL="457200" indent="-304200">
+            <a:pPr marL="457200" indent="-303840">
+              <a:lnSpc>
+                <a:spcPct val="100000"/>
+              </a:lnSpc>
+            </a:pPr>
+            <a:endParaRPr/>
+          </a:p>
+          <a:p>
+            <a:pPr marL="457200" indent="-303840">
               <a:lnSpc>
                 <a:spcPct val="100000"/>
               </a:lnSpc>
@@ -10072,7 +10092,7 @@
             <a:endParaRPr/>
           </a:p>
           <a:p>
-            <a:pPr marL="457200" indent="-304200">
+            <a:pPr marL="457200" indent="-303840">
               <a:lnSpc>
                 <a:spcPct val="100000"/>
               </a:lnSpc>
@@ -10125,31 +10145,31 @@
             <a:endParaRPr/>
           </a:p>
           <a:p>
-            <a:pPr marL="457200" indent="-304200">
-              <a:lnSpc>
-                <a:spcPct val="100000"/>
-              </a:lnSpc>
-            </a:pPr>
-            <a:endParaRPr/>
-          </a:p>
-          <a:p>
-            <a:pPr marL="457200" indent="-304200">
-              <a:lnSpc>
-                <a:spcPct val="100000"/>
-              </a:lnSpc>
-            </a:pPr>
-            <a:endParaRPr/>
-          </a:p>
-          <a:p>
-            <a:pPr marL="343080" indent="-342360">
-              <a:lnSpc>
-                <a:spcPct val="100000"/>
-              </a:lnSpc>
-            </a:pPr>
-            <a:endParaRPr/>
-          </a:p>
-          <a:p>
-            <a:pPr marL="457200" indent="-342360">
+            <a:pPr marL="457200" indent="-303840">
+              <a:lnSpc>
+                <a:spcPct val="100000"/>
+              </a:lnSpc>
+            </a:pPr>
+            <a:endParaRPr/>
+          </a:p>
+          <a:p>
+            <a:pPr marL="457200" indent="-303840">
+              <a:lnSpc>
+                <a:spcPct val="100000"/>
+              </a:lnSpc>
+            </a:pPr>
+            <a:endParaRPr/>
+          </a:p>
+          <a:p>
+            <a:pPr marL="343080" indent="-342000">
+              <a:lnSpc>
+                <a:spcPct val="100000"/>
+              </a:lnSpc>
+            </a:pPr>
+            <a:endParaRPr/>
+          </a:p>
+          <a:p>
+            <a:pPr marL="457200" indent="-342000">
               <a:lnSpc>
                 <a:spcPct val="100000"/>
               </a:lnSpc>
@@ -10160,14 +10180,14 @@
       </p:sp>
       <p:sp>
         <p:nvSpPr>
-          <p:cNvPr id="90" name="CustomShape 2"/>
+          <p:cNvPr id="89" name="CustomShape 2"/>
           <p:cNvSpPr/>
           <p:nvPr/>
         </p:nvSpPr>
         <p:spPr>
           <a:xfrm>
             <a:off x="0" y="6572160"/>
-            <a:ext cx="785160" cy="285120"/>
+            <a:ext cx="784800" cy="284760"/>
           </a:xfrm>
           <a:prstGeom prst="rect">
             <a:avLst/>
@@ -10199,14 +10219,14 @@
       </p:sp>
       <p:sp>
         <p:nvSpPr>
-          <p:cNvPr id="91" name="CustomShape 3"/>
+          <p:cNvPr id="90" name="CustomShape 3"/>
           <p:cNvSpPr/>
           <p:nvPr/>
         </p:nvSpPr>
         <p:spPr>
           <a:xfrm>
             <a:off x="428760" y="642960"/>
-            <a:ext cx="8257320" cy="785160"/>
+            <a:ext cx="8256960" cy="784800"/>
           </a:xfrm>
           <a:prstGeom prst="rect">
             <a:avLst/>
@@ -10225,7 +10245,7 @@
         <p:txBody>
           <a:bodyPr lIns="90000" rIns="90000" tIns="45000" bIns="45000" anchor="ctr"/>
           <a:p>
-            <a:pPr marL="571680" indent="-570960">
+            <a:pPr marL="571680" indent="-570600">
               <a:lnSpc>
                 <a:spcPct val="100000"/>
               </a:lnSpc>
@@ -10243,6 +10263,7 @@
                   </a:solidFill>
                 </a:uFill>
                 <a:latin typeface="Calibri"/>
+                <a:ea typeface="DejaVu Sans"/>
               </a:rPr>
               <a:t>First lesson</a:t>
             </a:r>
@@ -10301,14 +10322,14 @@
       </p:grpSpPr>
       <p:sp>
         <p:nvSpPr>
-          <p:cNvPr id="92" name="CustomShape 1"/>
+          <p:cNvPr id="91" name="CustomShape 1"/>
           <p:cNvSpPr/>
           <p:nvPr/>
         </p:nvSpPr>
         <p:spPr>
           <a:xfrm>
             <a:off x="457200" y="1714320"/>
-            <a:ext cx="8228880" cy="4411080"/>
+            <a:ext cx="8228520" cy="4410720"/>
           </a:xfrm>
           <a:prstGeom prst="rect">
             <a:avLst/>
@@ -10327,7 +10348,7 @@
         <p:txBody>
           <a:bodyPr lIns="90000" rIns="90000" tIns="45000" bIns="45000"/>
           <a:p>
-            <a:pPr marL="343080" indent="-342360">
+            <a:pPr marL="343080" indent="-342000">
               <a:lnSpc>
                 <a:spcPct val="100000"/>
               </a:lnSpc>
@@ -10343,6 +10364,7 @@
                   </a:solidFill>
                 </a:uFill>
                 <a:latin typeface="Calibri"/>
+                <a:ea typeface="DejaVu Sans"/>
               </a:rPr>
               <a:t>The business subject</a:t>
             </a:r>
@@ -10357,13 +10379,14 @@
                   </a:solidFill>
                 </a:uFill>
                 <a:latin typeface="Calibri"/>
+                <a:ea typeface="DejaVu Sans"/>
               </a:rPr>
               <a:t> :</a:t>
             </a:r>
             <a:endParaRPr/>
           </a:p>
           <a:p>
-            <a:pPr marL="343080" indent="-342360">
+            <a:pPr marL="343080" indent="-342000">
               <a:lnSpc>
                 <a:spcPct val="100000"/>
               </a:lnSpc>
@@ -10379,6 +10402,7 @@
                   </a:solidFill>
                 </a:uFill>
                 <a:latin typeface="Calibri"/>
+                <a:ea typeface="DejaVu Sans"/>
               </a:rPr>
               <a:t>In this picture, we have all business subjects for our system with their definitions </a:t>
             </a:r>
@@ -10388,14 +10412,14 @@
       </p:sp>
       <p:sp>
         <p:nvSpPr>
-          <p:cNvPr id="93" name="CustomShape 2"/>
+          <p:cNvPr id="92" name="CustomShape 2"/>
           <p:cNvSpPr/>
           <p:nvPr/>
         </p:nvSpPr>
         <p:spPr>
           <a:xfrm>
             <a:off x="0" y="6572160"/>
-            <a:ext cx="785160" cy="285120"/>
+            <a:ext cx="784800" cy="284760"/>
           </a:xfrm>
           <a:prstGeom prst="rect">
             <a:avLst/>
@@ -10427,14 +10451,14 @@
       </p:sp>
       <p:sp>
         <p:nvSpPr>
-          <p:cNvPr id="94" name="CustomShape 3"/>
+          <p:cNvPr id="93" name="CustomShape 3"/>
           <p:cNvSpPr/>
           <p:nvPr/>
         </p:nvSpPr>
         <p:spPr>
           <a:xfrm>
             <a:off x="428760" y="642960"/>
-            <a:ext cx="8257320" cy="785160"/>
+            <a:ext cx="8256960" cy="784800"/>
           </a:xfrm>
           <a:prstGeom prst="rect">
             <a:avLst/>
@@ -10453,7 +10477,7 @@
         <p:txBody>
           <a:bodyPr lIns="90000" rIns="90000" tIns="45000" bIns="45000" anchor="ctr"/>
           <a:p>
-            <a:pPr marL="571680" indent="-570960">
+            <a:pPr marL="571680" indent="-570600">
               <a:lnSpc>
                 <a:spcPct val="100000"/>
               </a:lnSpc>
@@ -10481,7 +10505,7 @@
       </p:sp>
       <p:pic>
         <p:nvPicPr>
-          <p:cNvPr id="95" name="Shape 72" descr=""/>
+          <p:cNvPr id="94" name="Shape 72" descr=""/>
           <p:cNvPicPr/>
           <p:nvPr/>
         </p:nvPicPr>
@@ -10492,7 +10516,7 @@
         <p:spPr>
           <a:xfrm>
             <a:off x="900000" y="2464920"/>
-            <a:ext cx="6875640" cy="3942720"/>
+            <a:ext cx="6875280" cy="3942360"/>
           </a:xfrm>
           <a:prstGeom prst="rect">
             <a:avLst/>
@@ -10553,14 +10577,14 @@
       </p:grpSpPr>
       <p:sp>
         <p:nvSpPr>
-          <p:cNvPr id="96" name="CustomShape 1"/>
+          <p:cNvPr id="95" name="CustomShape 1"/>
           <p:cNvSpPr/>
           <p:nvPr/>
         </p:nvSpPr>
         <p:spPr>
           <a:xfrm>
             <a:off x="428760" y="1785960"/>
-            <a:ext cx="8228880" cy="4411080"/>
+            <a:ext cx="8228520" cy="4410720"/>
           </a:xfrm>
           <a:prstGeom prst="rect">
             <a:avLst/>
@@ -10579,7 +10603,7 @@
         <p:txBody>
           <a:bodyPr lIns="90000" rIns="90000" tIns="45000" bIns="45000"/>
           <a:p>
-            <a:pPr marL="343080" indent="-342360">
+            <a:pPr marL="343080" indent="-342000">
               <a:lnSpc>
                 <a:spcPct val="100000"/>
               </a:lnSpc>
@@ -10595,6 +10619,7 @@
                   </a:solidFill>
                 </a:uFill>
                 <a:latin typeface="Calibri"/>
+                <a:ea typeface="DejaVu Sans"/>
               </a:rPr>
               <a:t>The MVC model </a:t>
             </a:r>
@@ -10609,13 +10634,14 @@
                   </a:solidFill>
                 </a:uFill>
                 <a:latin typeface="Calibri"/>
+                <a:ea typeface="DejaVu Sans"/>
               </a:rPr>
               <a:t>:</a:t>
             </a:r>
             <a:endParaRPr/>
           </a:p>
           <a:p>
-            <a:pPr marL="343080" indent="-342360">
+            <a:pPr marL="343080" indent="-342000">
               <a:lnSpc>
                 <a:spcPct val="100000"/>
               </a:lnSpc>
@@ -10631,6 +10657,7 @@
                   </a:solidFill>
                 </a:uFill>
                 <a:latin typeface="Calibri"/>
+                <a:ea typeface="DejaVu Sans"/>
               </a:rPr>
               <a:t>This is the MVC model for our system, it shows the various subsystem and relation between them </a:t>
             </a:r>
@@ -10640,14 +10667,14 @@
       </p:sp>
       <p:sp>
         <p:nvSpPr>
-          <p:cNvPr id="97" name="CustomShape 2"/>
+          <p:cNvPr id="96" name="CustomShape 2"/>
           <p:cNvSpPr/>
           <p:nvPr/>
         </p:nvSpPr>
         <p:spPr>
           <a:xfrm>
             <a:off x="0" y="6572160"/>
-            <a:ext cx="785160" cy="285120"/>
+            <a:ext cx="784800" cy="284760"/>
           </a:xfrm>
           <a:prstGeom prst="rect">
             <a:avLst/>
@@ -10679,7 +10706,7 @@
       </p:sp>
       <p:pic>
         <p:nvPicPr>
-          <p:cNvPr id="98" name="Shape 78" descr=""/>
+          <p:cNvPr id="97" name="Shape 78" descr=""/>
           <p:cNvPicPr/>
           <p:nvPr/>
         </p:nvPicPr>
@@ -10690,7 +10717,7 @@
         <p:spPr>
           <a:xfrm>
             <a:off x="928800" y="2357280"/>
-            <a:ext cx="7057440" cy="4142520"/>
+            <a:ext cx="7057080" cy="4142160"/>
           </a:xfrm>
           <a:prstGeom prst="rect">
             <a:avLst/>
@@ -10702,14 +10729,14 @@
       </p:pic>
       <p:sp>
         <p:nvSpPr>
-          <p:cNvPr id="99" name="CustomShape 3"/>
+          <p:cNvPr id="98" name="CustomShape 3"/>
           <p:cNvSpPr/>
           <p:nvPr/>
         </p:nvSpPr>
         <p:spPr>
           <a:xfrm>
             <a:off x="428760" y="642960"/>
-            <a:ext cx="8257320" cy="785160"/>
+            <a:ext cx="8256960" cy="784800"/>
           </a:xfrm>
           <a:prstGeom prst="rect">
             <a:avLst/>
@@ -10728,7 +10755,7 @@
         <p:txBody>
           <a:bodyPr lIns="90000" rIns="90000" tIns="45000" bIns="45000" anchor="ctr"/>
           <a:p>
-            <a:pPr marL="571680" indent="-570960">
+            <a:pPr marL="571680" indent="-570600">
               <a:lnSpc>
                 <a:spcPct val="100000"/>
               </a:lnSpc>
@@ -10805,137 +10832,14 @@
       </p:grpSpPr>
       <p:sp>
         <p:nvSpPr>
-          <p:cNvPr id="100" name="CustomShape 1"/>
+          <p:cNvPr id="99" name="CustomShape 1"/>
           <p:cNvSpPr/>
           <p:nvPr/>
         </p:nvSpPr>
         <p:spPr>
           <a:xfrm>
-            <a:off x="428760" y="1785960"/>
-            <a:ext cx="8228880" cy="4411080"/>
-          </a:xfrm>
-          <a:prstGeom prst="rect">
-            <a:avLst/>
-          </a:prstGeom>
-          <a:noFill/>
-          <a:ln>
-            <a:noFill/>
-          </a:ln>
-        </p:spPr>
-        <p:style>
-          <a:lnRef idx="0"/>
-          <a:fillRef idx="0"/>
-          <a:effectRef idx="0"/>
-          <a:fontRef idx="minor"/>
-        </p:style>
-        <p:txBody>
-          <a:bodyPr lIns="90000" rIns="90000" tIns="45000" bIns="45000"/>
-          <a:p>
-            <a:pPr marL="343080" indent="-342360">
-              <a:lnSpc>
-                <a:spcPct val="100000"/>
-              </a:lnSpc>
-            </a:pPr>
-            <a:r>
-              <a:rPr b="1" lang="en-US" sz="1500" spc="-1" strike="noStrike" u="sng">
-                <a:solidFill>
-                  <a:srgbClr val="c00000"/>
-                </a:solidFill>
-                <a:uFill>
-                  <a:solidFill>
-                    <a:srgbClr val="ffffff"/>
-                  </a:solidFill>
-                </a:uFill>
-                <a:latin typeface="Calibri"/>
-              </a:rPr>
-              <a:t>The organigram of our is</a:t>
-            </a:r>
-            <a:r>
-              <a:rPr b="1" lang="en-US" sz="1500" spc="-1" strike="noStrike">
-                <a:solidFill>
-                  <a:srgbClr val="c00000"/>
-                </a:solidFill>
-                <a:uFill>
-                  <a:solidFill>
-                    <a:srgbClr val="ffffff"/>
-                  </a:solidFill>
-                </a:uFill>
-                <a:latin typeface="Calibri"/>
-              </a:rPr>
-              <a:t> :</a:t>
-            </a:r>
-            <a:endParaRPr/>
-          </a:p>
-          <a:p>
-            <a:pPr marL="343080" indent="-342360">
-              <a:lnSpc>
-                <a:spcPct val="100000"/>
-              </a:lnSpc>
-            </a:pPr>
-            <a:r>
-              <a:rPr lang="en-US" sz="1500" spc="-1" strike="noStrike">
-                <a:solidFill>
-                  <a:srgbClr val="000000"/>
-                </a:solidFill>
-                <a:uFill>
-                  <a:solidFill>
-                    <a:srgbClr val="ffffff"/>
-                  </a:solidFill>
-                </a:uFill>
-                <a:latin typeface="Calibri"/>
-              </a:rPr>
-              <a:t>We are going to work by three groups composed of 4 people for server part, 4 again for</a:t>
-            </a:r>
-            <a:endParaRPr/>
-          </a:p>
-          <a:p>
-            <a:pPr marL="343080" indent="-342360">
-              <a:lnSpc>
-                <a:spcPct val="100000"/>
-              </a:lnSpc>
-            </a:pPr>
-            <a:r>
-              <a:rPr lang="en-US" sz="1500" spc="-1" strike="noStrike">
-                <a:solidFill>
-                  <a:srgbClr val="000000"/>
-                </a:solidFill>
-                <a:uFill>
-                  <a:solidFill>
-                    <a:srgbClr val="ffffff"/>
-                  </a:solidFill>
-                </a:uFill>
-                <a:latin typeface="Calibri"/>
-              </a:rPr>
-              <a:t>communication part and then two persons for the display part.</a:t>
-            </a:r>
-            <a:r>
-              <a:rPr b="1" lang="en-US" sz="1500" spc="-1" strike="noStrike">
-                <a:solidFill>
-                  <a:srgbClr val="000000"/>
-                </a:solidFill>
-                <a:uFill>
-                  <a:solidFill>
-                    <a:srgbClr val="ffffff"/>
-                  </a:solidFill>
-                </a:uFill>
-                <a:latin typeface="Calibri"/>
-              </a:rPr>
-              <a:t> </a:t>
-            </a:r>
-            <a:endParaRPr/>
-          </a:p>
-        </p:txBody>
-      </p:sp>
-      <p:sp>
-        <p:nvSpPr>
-          <p:cNvPr id="101" name="CustomShape 2"/>
-          <p:cNvSpPr/>
-          <p:nvPr/>
-        </p:nvSpPr>
-        <p:spPr>
-          <a:xfrm>
             <a:off x="0" y="6572160"/>
-            <a:ext cx="785160" cy="285120"/>
+            <a:ext cx="784800" cy="284760"/>
           </a:xfrm>
           <a:prstGeom prst="rect">
             <a:avLst/>
@@ -10967,14 +10871,14 @@
       </p:sp>
       <p:sp>
         <p:nvSpPr>
-          <p:cNvPr id="102" name="CustomShape 3"/>
+          <p:cNvPr id="100" name="CustomShape 2"/>
           <p:cNvSpPr/>
           <p:nvPr/>
         </p:nvSpPr>
         <p:spPr>
           <a:xfrm>
             <a:off x="428760" y="642960"/>
-            <a:ext cx="8257320" cy="785160"/>
+            <a:ext cx="8256960" cy="784800"/>
           </a:xfrm>
           <a:prstGeom prst="rect">
             <a:avLst/>
@@ -10993,7 +10897,7 @@
         <p:txBody>
           <a:bodyPr lIns="90000" rIns="90000" tIns="45000" bIns="45000" anchor="ctr"/>
           <a:p>
-            <a:pPr marL="571680" indent="-570960">
+            <a:pPr marL="571680" indent="-570600">
               <a:lnSpc>
                 <a:spcPct val="100000"/>
               </a:lnSpc>
@@ -11009,6 +10913,7 @@
                   </a:solidFill>
                 </a:uFill>
                 <a:latin typeface="Calibri"/>
+                <a:ea typeface="DejaVu Sans"/>
               </a:rPr>
               <a:t>II.   Second lesson</a:t>
             </a:r>
@@ -11018,14 +10923,14 @@
       </p:sp>
       <p:sp>
         <p:nvSpPr>
-          <p:cNvPr id="103" name="CustomShape 4"/>
+          <p:cNvPr id="101" name="CustomShape 3"/>
           <p:cNvSpPr/>
           <p:nvPr/>
         </p:nvSpPr>
         <p:spPr>
           <a:xfrm>
             <a:off x="2736000" y="6309360"/>
-            <a:ext cx="5571360" cy="227160"/>
+            <a:ext cx="5571000" cy="226800"/>
           </a:xfrm>
           <a:prstGeom prst="rect">
             <a:avLst/>
@@ -11062,7 +10967,7 @@
                 <a:latin typeface="Arial"/>
                 <a:ea typeface="DejaVu Sans"/>
               </a:rPr>
-              <a:t>Lea for display part, Raphael for server &amp; Christ for communication part </a:t>
+              <a:t> </a:t>
             </a:r>
             <a:endParaRPr/>
           </a:p>
@@ -11070,19 +10975,18 @@
       </p:sp>
       <p:pic>
         <p:nvPicPr>
-          <p:cNvPr id="104" name="Shape 84" descr=""/>
+          <p:cNvPr id="102" name="" descr=""/>
           <p:cNvPicPr/>
           <p:nvPr/>
         </p:nvPicPr>
         <p:blipFill>
           <a:blip r:embed="rId2"/>
-          <a:srcRect l="0" t="0" r="0" b="20298"/>
           <a:stretch/>
         </p:blipFill>
         <p:spPr>
           <a:xfrm>
-            <a:off x="1593360" y="2766600"/>
-            <a:ext cx="6113160" cy="3671280"/>
+            <a:off x="123480" y="3291840"/>
+            <a:ext cx="8929080" cy="2468880"/>
           </a:xfrm>
           <a:prstGeom prst="rect">
             <a:avLst/>
@@ -11092,6 +10996,38 @@
           </a:ln>
         </p:spPr>
       </p:pic>
+      <p:sp>
+        <p:nvSpPr>
+          <p:cNvPr id="103" name="TextShape 4"/>
+          <p:cNvSpPr txBox="1"/>
+          <p:nvPr/>
+        </p:nvSpPr>
+        <p:spPr>
+          <a:xfrm>
+            <a:off x="914400" y="2305440"/>
+            <a:ext cx="7273440" cy="346320"/>
+          </a:xfrm>
+          <a:prstGeom prst="rect">
+            <a:avLst/>
+          </a:prstGeom>
+          <a:noFill/>
+          <a:ln>
+            <a:noFill/>
+          </a:ln>
+        </p:spPr>
+        <p:txBody>
+          <a:bodyPr lIns="90000" rIns="90000" tIns="45000" bIns="45000"/>
+          <a:p>
+            <a:r>
+              <a:rPr lang="en-US" sz="1800" spc="-1">
+                <a:latin typeface="Arial"/>
+              </a:rPr>
+              <a:t>Organization chart encompassing the four components of the system :</a:t>
+            </a:r>
+            <a:endParaRPr/>
+          </a:p>
+        </p:txBody>
+      </p:sp>
     </p:spTree>
   </p:cSld>
   <p:timing>

</xml_diff>